<commit_message>
Rename City in CityDistrict
</commit_message>
<xml_diff>
--- a/Руководство.pptx
+++ b/Руководство.pptx
@@ -14,9 +14,10 @@
     <p:sldId id="262" r:id="rId8"/>
     <p:sldId id="263" r:id="rId9"/>
     <p:sldId id="265" r:id="rId10"/>
-    <p:sldId id="264" r:id="rId11"/>
-    <p:sldId id="266" r:id="rId12"/>
-    <p:sldId id="267" r:id="rId13"/>
+    <p:sldId id="268" r:id="rId11"/>
+    <p:sldId id="264" r:id="rId12"/>
+    <p:sldId id="266" r:id="rId13"/>
+    <p:sldId id="267" r:id="rId14"/>
   </p:sldIdLst>
   <p:sldSz cx="12192000" cy="6858000"/>
   <p:notesSz cx="6858000" cy="9144000"/>
@@ -129,6 +130,7 @@
             <p14:sldId id="262"/>
             <p14:sldId id="263"/>
             <p14:sldId id="265"/>
+            <p14:sldId id="268"/>
             <p14:sldId id="264"/>
             <p14:sldId id="266"/>
             <p14:sldId id="267"/>
@@ -137,7 +139,7 @@
       </p14:sectionLst>
     </p:ext>
     <p:ext uri="{EFAFB233-063F-42B5-8137-9DF3F51BA10A}">
-      <p15:sldGuideLst xmlns:p15="http://schemas.microsoft.com/office/powerpoint/2012/main" xmlns=""/>
+      <p15:sldGuideLst xmlns="" xmlns:p15="http://schemas.microsoft.com/office/powerpoint/2012/main"/>
     </p:ext>
   </p:extLst>
 </p:presentation>
@@ -274,7 +276,7 @@
           <a:p>
             <a:fld id="{BDAFED10-0FD7-4E1B-8952-6337C462D438}" type="datetimeFigureOut">
               <a:rPr lang="ru-RU" smtClean="0"/>
-              <a:t>09.08.2021</a:t>
+              <a:t>10.08.2021</a:t>
             </a:fld>
             <a:endParaRPr lang="ru-RU"/>
           </a:p>
@@ -444,7 +446,7 @@
           <a:p>
             <a:fld id="{BDAFED10-0FD7-4E1B-8952-6337C462D438}" type="datetimeFigureOut">
               <a:rPr lang="ru-RU" smtClean="0"/>
-              <a:t>09.08.2021</a:t>
+              <a:t>10.08.2021</a:t>
             </a:fld>
             <a:endParaRPr lang="ru-RU"/>
           </a:p>
@@ -624,7 +626,7 @@
           <a:p>
             <a:fld id="{BDAFED10-0FD7-4E1B-8952-6337C462D438}" type="datetimeFigureOut">
               <a:rPr lang="ru-RU" smtClean="0"/>
-              <a:t>09.08.2021</a:t>
+              <a:t>10.08.2021</a:t>
             </a:fld>
             <a:endParaRPr lang="ru-RU"/>
           </a:p>
@@ -794,7 +796,7 @@
           <a:p>
             <a:fld id="{BDAFED10-0FD7-4E1B-8952-6337C462D438}" type="datetimeFigureOut">
               <a:rPr lang="ru-RU" smtClean="0"/>
-              <a:t>09.08.2021</a:t>
+              <a:t>10.08.2021</a:t>
             </a:fld>
             <a:endParaRPr lang="ru-RU"/>
           </a:p>
@@ -1040,7 +1042,7 @@
           <a:p>
             <a:fld id="{BDAFED10-0FD7-4E1B-8952-6337C462D438}" type="datetimeFigureOut">
               <a:rPr lang="ru-RU" smtClean="0"/>
-              <a:t>09.08.2021</a:t>
+              <a:t>10.08.2021</a:t>
             </a:fld>
             <a:endParaRPr lang="ru-RU"/>
           </a:p>
@@ -1272,7 +1274,7 @@
           <a:p>
             <a:fld id="{BDAFED10-0FD7-4E1B-8952-6337C462D438}" type="datetimeFigureOut">
               <a:rPr lang="ru-RU" smtClean="0"/>
-              <a:t>09.08.2021</a:t>
+              <a:t>10.08.2021</a:t>
             </a:fld>
             <a:endParaRPr lang="ru-RU"/>
           </a:p>
@@ -1639,7 +1641,7 @@
           <a:p>
             <a:fld id="{BDAFED10-0FD7-4E1B-8952-6337C462D438}" type="datetimeFigureOut">
               <a:rPr lang="ru-RU" smtClean="0"/>
-              <a:t>09.08.2021</a:t>
+              <a:t>10.08.2021</a:t>
             </a:fld>
             <a:endParaRPr lang="ru-RU"/>
           </a:p>
@@ -1757,7 +1759,7 @@
           <a:p>
             <a:fld id="{BDAFED10-0FD7-4E1B-8952-6337C462D438}" type="datetimeFigureOut">
               <a:rPr lang="ru-RU" smtClean="0"/>
-              <a:t>09.08.2021</a:t>
+              <a:t>10.08.2021</a:t>
             </a:fld>
             <a:endParaRPr lang="ru-RU"/>
           </a:p>
@@ -1852,7 +1854,7 @@
           <a:p>
             <a:fld id="{BDAFED10-0FD7-4E1B-8952-6337C462D438}" type="datetimeFigureOut">
               <a:rPr lang="ru-RU" smtClean="0"/>
-              <a:t>09.08.2021</a:t>
+              <a:t>10.08.2021</a:t>
             </a:fld>
             <a:endParaRPr lang="ru-RU"/>
           </a:p>
@@ -2129,7 +2131,7 @@
           <a:p>
             <a:fld id="{BDAFED10-0FD7-4E1B-8952-6337C462D438}" type="datetimeFigureOut">
               <a:rPr lang="ru-RU" smtClean="0"/>
-              <a:t>09.08.2021</a:t>
+              <a:t>10.08.2021</a:t>
             </a:fld>
             <a:endParaRPr lang="ru-RU"/>
           </a:p>
@@ -2382,7 +2384,7 @@
           <a:p>
             <a:fld id="{BDAFED10-0FD7-4E1B-8952-6337C462D438}" type="datetimeFigureOut">
               <a:rPr lang="ru-RU" smtClean="0"/>
-              <a:t>09.08.2021</a:t>
+              <a:t>10.08.2021</a:t>
             </a:fld>
             <a:endParaRPr lang="ru-RU"/>
           </a:p>
@@ -2595,7 +2597,7 @@
           <a:p>
             <a:fld id="{BDAFED10-0FD7-4E1B-8952-6337C462D438}" type="datetimeFigureOut">
               <a:rPr lang="ru-RU" smtClean="0"/>
-              <a:t>09.08.2021</a:t>
+              <a:t>10.08.2021</a:t>
             </a:fld>
             <a:endParaRPr lang="ru-RU"/>
           </a:p>
@@ -3121,21 +3123,30 @@
         </p:nvSpPr>
         <p:spPr>
           <a:xfrm>
-            <a:off x="838200" y="60386"/>
-            <a:ext cx="10515600" cy="664234"/>
+            <a:off x="872706" y="80454"/>
+            <a:ext cx="10515600" cy="540648"/>
           </a:xfrm>
         </p:spPr>
         <p:txBody>
           <a:bodyPr>
-            <a:normAutofit/>
+            <a:noAutofit/>
           </a:bodyPr>
           <a:lstStyle/>
           <a:p>
             <a:pPr algn="ctr"/>
             <a:r>
-              <a:rPr lang="ru-RU" sz="2400" b="1" dirty="0"/>
-              <a:t>Загрузка из файлов</a:t>
-            </a:r>
+              <a:rPr lang="ru-RU" sz="3200" dirty="0" smtClean="0"/>
+              <a:t>Распечатка </a:t>
+            </a:r>
+            <a:r>
+              <a:rPr lang="en-US" sz="3200" dirty="0" smtClean="0"/>
+              <a:t>QR-</a:t>
+            </a:r>
+            <a:r>
+              <a:rPr lang="ru-RU" sz="3200" dirty="0" smtClean="0"/>
+              <a:t>кода</a:t>
+            </a:r>
+            <a:endParaRPr lang="ru-RU" sz="3200" dirty="0"/>
           </a:p>
         </p:txBody>
       </p:sp>
@@ -3151,67 +3162,93 @@
         </p:nvSpPr>
         <p:spPr>
           <a:xfrm>
-            <a:off x="0" y="750498"/>
-            <a:ext cx="3277705" cy="6107501"/>
+            <a:off x="60386" y="344033"/>
+            <a:ext cx="3907766" cy="6255176"/>
           </a:xfrm>
         </p:spPr>
         <p:txBody>
           <a:bodyPr>
-            <a:normAutofit fontScale="92500" lnSpcReduction="10000"/>
+            <a:normAutofit fontScale="70000" lnSpcReduction="20000"/>
           </a:bodyPr>
           <a:lstStyle/>
           <a:p>
             <a:r>
-              <a:rPr lang="ru-RU" sz="2000" dirty="0" smtClean="0"/>
-              <a:t>В личном кабинете пользователя есть возможность загрузить данные из файлов «.</a:t>
-            </a:r>
-            <a:r>
-              <a:rPr lang="en-US" sz="2000" dirty="0" err="1" smtClean="0"/>
-              <a:t>xls</a:t>
-            </a:r>
-            <a:r>
-              <a:rPr lang="ru-RU" sz="2000" dirty="0" smtClean="0"/>
-              <a:t>»</a:t>
-            </a:r>
-            <a:r>
-              <a:rPr lang="en-US" sz="2000" dirty="0" smtClean="0"/>
-              <a:t> </a:t>
-            </a:r>
-            <a:r>
-              <a:rPr lang="ru-RU" sz="2000" dirty="0" smtClean="0"/>
-              <a:t>установленного формата. Названия населенных пунктов, улиц, домов, сферы деятельности, должно строго соответствовать наименованиям данных категорий в сервисе для корректной загрузки.</a:t>
-            </a:r>
-          </a:p>
-          <a:p>
-            <a:r>
-              <a:rPr lang="ru-RU" sz="2000" dirty="0" smtClean="0"/>
-              <a:t>Если адрес в файле указан верно и данному адресу в сервисе соответствует избирательный участок, то участок загрузится в соответствии с указанным адресом. Иначе будет произведена попытка поиска нужного участка по номеру указанному в файле. Иначе строка не будет загружена.</a:t>
-            </a:r>
-            <a:endParaRPr lang="ru-RU" sz="2000" dirty="0"/>
-          </a:p>
-        </p:txBody>
-      </p:sp>
-      <p:sp>
-        <p:nvSpPr>
-          <p:cNvPr id="4" name="Объект 3"/>
-          <p:cNvSpPr>
-            <a:spLocks noGrp="1"/>
-          </p:cNvSpPr>
-          <p:nvPr>
-            <p:ph sz="half" idx="2"/>
-          </p:nvPr>
-        </p:nvSpPr>
-        <p:spPr>
-          <a:xfrm>
-            <a:off x="3174023" y="793631"/>
-            <a:ext cx="8928837" cy="5960852"/>
-          </a:xfrm>
-        </p:spPr>
-        <p:txBody>
-          <a:bodyPr>
-            <a:normAutofit fontScale="92500" lnSpcReduction="10000"/>
-          </a:bodyPr>
-          <a:lstStyle/>
+              <a:rPr lang="ru-RU" dirty="0" smtClean="0"/>
+              <a:t>Для распечатки </a:t>
+            </a:r>
+            <a:r>
+              <a:rPr lang="en-US" dirty="0" smtClean="0"/>
+              <a:t>QR-</a:t>
+            </a:r>
+            <a:r>
+              <a:rPr lang="ru-RU" dirty="0" smtClean="0"/>
+              <a:t>кода необходимо в таблице пользователей выбрать подробнее у нужного пользователя, пройти по ссылке.</a:t>
+            </a:r>
+          </a:p>
+          <a:p>
+            <a:r>
+              <a:rPr lang="ru-RU" dirty="0" smtClean="0"/>
+              <a:t>Откроется страница подробной информации избирателя. </a:t>
+            </a:r>
+          </a:p>
+          <a:p>
+            <a:r>
+              <a:rPr lang="ru-RU" dirty="0" smtClean="0"/>
+              <a:t>Правой кнопкой мыши (ПКМ) по изображению </a:t>
+            </a:r>
+            <a:r>
+              <a:rPr lang="en-US" dirty="0" smtClean="0"/>
+              <a:t>QR-</a:t>
+            </a:r>
+            <a:r>
+              <a:rPr lang="ru-RU" dirty="0" smtClean="0"/>
+              <a:t>кода «Сохранить как…».</a:t>
+            </a:r>
+          </a:p>
+          <a:p>
+            <a:r>
+              <a:rPr lang="ru-RU" dirty="0" smtClean="0"/>
+              <a:t>Просмотреть сохраненное изображение.</a:t>
+            </a:r>
+          </a:p>
+          <a:p>
+            <a:r>
+              <a:rPr lang="ru-RU" dirty="0" smtClean="0"/>
+              <a:t>Если размер изображения </a:t>
+            </a:r>
+            <a:r>
+              <a:rPr lang="en-US" dirty="0" smtClean="0"/>
+              <a:t>QR-</a:t>
+            </a:r>
+            <a:r>
+              <a:rPr lang="ru-RU" dirty="0" smtClean="0"/>
+              <a:t>кода не подходит, тогда нажать ПКМ по файлу изображения «Открыть с помощью…» </a:t>
+            </a:r>
+            <a:r>
+              <a:rPr lang="en-US" dirty="0" smtClean="0"/>
+              <a:t>&gt; Paint</a:t>
+            </a:r>
+            <a:r>
+              <a:rPr lang="ru-RU" dirty="0" smtClean="0"/>
+              <a:t>. В </a:t>
+            </a:r>
+            <a:r>
+              <a:rPr lang="en-US" dirty="0" smtClean="0"/>
+              <a:t>Paint </a:t>
+            </a:r>
+            <a:r>
+              <a:rPr lang="ru-RU" dirty="0" smtClean="0"/>
+              <a:t>на панели инструментов выбрать «Изменить размер». Выбрать «Проценты» </a:t>
+            </a:r>
+            <a:r>
+              <a:rPr lang="en-US" dirty="0" smtClean="0"/>
+              <a:t>&gt; </a:t>
+            </a:r>
+            <a:r>
+              <a:rPr lang="ru-RU" dirty="0" smtClean="0"/>
+              <a:t>задать одинаковые значения по горизонтали и вертикали.</a:t>
+            </a:r>
+          </a:p>
           <a:p>
             <a:endParaRPr lang="ru-RU" dirty="0"/>
           </a:p>
@@ -3219,11 +3256,13 @@
       </p:sp>
       <p:pic>
         <p:nvPicPr>
-          <p:cNvPr id="2050" name="Picture 2"/>
+          <p:cNvPr id="6" name="Picture 2"/>
           <p:cNvPicPr>
-            <a:picLocks noChangeAspect="1" noChangeArrowheads="1"/>
+            <a:picLocks noGrp="1" noChangeAspect="1" noChangeArrowheads="1"/>
           </p:cNvPicPr>
-          <p:nvPr/>
+          <p:nvPr>
+            <p:ph sz="half" idx="2"/>
+          </p:nvPr>
         </p:nvPicPr>
         <p:blipFill>
           <a:blip r:embed="rId2">
@@ -3240,8 +3279,8 @@
         </p:blipFill>
         <p:spPr bwMode="auto">
           <a:xfrm>
-            <a:off x="3277705" y="1440612"/>
-            <a:ext cx="8811399" cy="3996034"/>
+            <a:off x="3987800" y="825681"/>
+            <a:ext cx="8204200" cy="1527616"/>
           </a:xfrm>
           <a:prstGeom prst="rect">
             <a:avLst/>
@@ -3281,115 +3320,16 @@
           </a:extLst>
         </p:spPr>
       </p:pic>
-    </p:spTree>
-    <p:extLst>
-      <p:ext uri="{BB962C8B-B14F-4D97-AF65-F5344CB8AC3E}">
-        <p14:creationId xmlns:p14="http://schemas.microsoft.com/office/powerpoint/2010/main" val="2778114306"/>
-      </p:ext>
-    </p:extLst>
-  </p:cSld>
-  <p:clrMapOvr>
-    <a:masterClrMapping/>
-  </p:clrMapOvr>
-</p:sld>
-</file>
-
-<file path=ppt/slides/slide11.xml><?xml version="1.0" encoding="utf-8"?>
-<p:sld xmlns:a="http://schemas.openxmlformats.org/drawingml/2006/main" xmlns:r="http://schemas.openxmlformats.org/officeDocument/2006/relationships" xmlns:p="http://schemas.openxmlformats.org/presentationml/2006/main">
-  <p:cSld>
-    <p:spTree>
-      <p:nvGrpSpPr>
-        <p:cNvPr id="1" name=""/>
-        <p:cNvGrpSpPr/>
-        <p:nvPr/>
-      </p:nvGrpSpPr>
-      <p:grpSpPr>
-        <a:xfrm>
-          <a:off x="0" y="0"/>
-          <a:ext cx="0" cy="0"/>
-          <a:chOff x="0" y="0"/>
-          <a:chExt cx="0" cy="0"/>
-        </a:xfrm>
-      </p:grpSpPr>
-      <p:sp>
-        <p:nvSpPr>
-          <p:cNvPr id="2" name="Заголовок 1"/>
-          <p:cNvSpPr>
-            <a:spLocks noGrp="1"/>
-          </p:cNvSpPr>
-          <p:nvPr>
-            <p:ph type="title"/>
-          </p:nvPr>
-        </p:nvSpPr>
-        <p:spPr>
-          <a:xfrm>
-            <a:off x="838200" y="365126"/>
-            <a:ext cx="10515600" cy="566528"/>
-          </a:xfrm>
-        </p:spPr>
-        <p:txBody>
-          <a:bodyPr>
-            <a:normAutofit/>
-          </a:bodyPr>
-          <a:lstStyle/>
-          <a:p>
-            <a:pPr algn="ctr"/>
-            <a:r>
-              <a:rPr lang="ru-RU" sz="2400" b="1" dirty="0" smtClean="0"/>
-              <a:t>УИК</a:t>
-            </a:r>
-            <a:endParaRPr lang="ru-RU" sz="2400" b="1" dirty="0"/>
-          </a:p>
-        </p:txBody>
-      </p:sp>
-      <p:sp>
-        <p:nvSpPr>
-          <p:cNvPr id="3" name="Объект 2"/>
-          <p:cNvSpPr>
-            <a:spLocks noGrp="1"/>
-          </p:cNvSpPr>
-          <p:nvPr>
-            <p:ph idx="1"/>
-          </p:nvPr>
-        </p:nvSpPr>
-        <p:spPr>
-          <a:xfrm>
-            <a:off x="319177" y="2104845"/>
-            <a:ext cx="8186468" cy="2113472"/>
-          </a:xfrm>
-        </p:spPr>
-        <p:txBody>
-          <a:bodyPr>
-            <a:normAutofit/>
-          </a:bodyPr>
-          <a:lstStyle/>
-          <a:p>
-            <a:r>
-              <a:rPr lang="ru-RU" sz="2000" dirty="0" smtClean="0"/>
-              <a:t>На станицы добавления избирателя, при наличии всех необходимых данных об адресе и УИК в базе данных, список УИК-</a:t>
-            </a:r>
-            <a:r>
-              <a:rPr lang="ru-RU" sz="2000" dirty="0" err="1" smtClean="0"/>
-              <a:t>ов</a:t>
-            </a:r>
-            <a:r>
-              <a:rPr lang="ru-RU" sz="2000" dirty="0" smtClean="0"/>
-              <a:t> будет обновляться динамически по мере выбора пользователем населенного пункта, затем улицы, при выборе дома останется 1-н УИК относящейся к данному дому. При этом пользователь может выбрать УИК и на стадии выбора улицы (будут выданы УИК относящиеся к выбранной улице), если дом не известен</a:t>
-            </a:r>
-            <a:endParaRPr lang="ru-RU" sz="2000" dirty="0"/>
-          </a:p>
-        </p:txBody>
-      </p:sp>
       <p:pic>
         <p:nvPicPr>
-          <p:cNvPr id="2053" name="Picture 5"/>
+          <p:cNvPr id="7" name="Picture 3"/>
           <p:cNvPicPr>
             <a:picLocks noChangeAspect="1" noChangeArrowheads="1"/>
           </p:cNvPicPr>
           <p:nvPr/>
         </p:nvPicPr>
         <p:blipFill>
-          <a:blip r:embed="rId2">
+          <a:blip r:embed="rId3">
             <a:extLst>
               <a:ext uri="{28A0092B-C50C-407E-A947-70E740481C1C}">
                 <a14:useLocalDpi xmlns:a14="http://schemas.microsoft.com/office/drawing/2010/main" val="0"/>
@@ -3403,8 +3343,8 @@
         </p:blipFill>
         <p:spPr bwMode="auto">
           <a:xfrm>
-            <a:off x="8884403" y="776377"/>
-            <a:ext cx="1856055" cy="5874318"/>
+            <a:off x="4200978" y="2444434"/>
+            <a:ext cx="2115395" cy="4244539"/>
           </a:xfrm>
           <a:prstGeom prst="rect">
             <a:avLst/>
@@ -3444,405 +3384,16 @@
           </a:extLst>
         </p:spPr>
       </p:pic>
-    </p:spTree>
-    <p:extLst>
-      <p:ext uri="{BB962C8B-B14F-4D97-AF65-F5344CB8AC3E}">
-        <p14:creationId xmlns:p14="http://schemas.microsoft.com/office/powerpoint/2010/main" val="2688907311"/>
-      </p:ext>
-    </p:extLst>
-  </p:cSld>
-  <p:clrMapOvr>
-    <a:masterClrMapping/>
-  </p:clrMapOvr>
-</p:sld>
-</file>
-
-<file path=ppt/slides/slide12.xml><?xml version="1.0" encoding="utf-8"?>
-<p:sld xmlns:a="http://schemas.openxmlformats.org/drawingml/2006/main" xmlns:r="http://schemas.openxmlformats.org/officeDocument/2006/relationships" xmlns:p="http://schemas.openxmlformats.org/presentationml/2006/main">
-  <p:cSld>
-    <p:spTree>
-      <p:nvGrpSpPr>
-        <p:cNvPr id="1" name=""/>
-        <p:cNvGrpSpPr/>
-        <p:nvPr/>
-      </p:nvGrpSpPr>
-      <p:grpSpPr>
-        <a:xfrm>
-          <a:off x="0" y="0"/>
-          <a:ext cx="0" cy="0"/>
-          <a:chOff x="0" y="0"/>
-          <a:chExt cx="0" cy="0"/>
-        </a:xfrm>
-      </p:grpSpPr>
-      <p:sp>
-        <p:nvSpPr>
-          <p:cNvPr id="2" name="Заголовок 1"/>
-          <p:cNvSpPr>
-            <a:spLocks noGrp="1"/>
-          </p:cNvSpPr>
-          <p:nvPr>
-            <p:ph type="title"/>
-          </p:nvPr>
-        </p:nvSpPr>
-        <p:spPr>
-          <a:xfrm>
-            <a:off x="838200" y="365126"/>
-            <a:ext cx="10515600" cy="592406"/>
-          </a:xfrm>
-        </p:spPr>
-        <p:txBody>
-          <a:bodyPr>
-            <a:normAutofit/>
-          </a:bodyPr>
-          <a:lstStyle/>
-          <a:p>
-            <a:pPr algn="ctr"/>
-            <a:r>
-              <a:rPr lang="ru-RU" sz="2400" b="1" dirty="0" smtClean="0"/>
-              <a:t>Мобильная версия</a:t>
-            </a:r>
-            <a:endParaRPr lang="ru-RU" sz="2400" b="1" dirty="0"/>
-          </a:p>
-        </p:txBody>
-      </p:sp>
-      <p:sp>
-        <p:nvSpPr>
-          <p:cNvPr id="3" name="Объект 2"/>
-          <p:cNvSpPr>
-            <a:spLocks noGrp="1"/>
-          </p:cNvSpPr>
-          <p:nvPr>
-            <p:ph idx="1"/>
-          </p:nvPr>
-        </p:nvSpPr>
-        <p:spPr/>
-        <p:txBody>
-          <a:bodyPr/>
-          <a:lstStyle/>
-          <a:p>
-            <a:pPr algn="ctr"/>
-            <a:r>
-              <a:rPr lang="ru-RU" dirty="0" smtClean="0"/>
-              <a:t>Доступна мобильная версия</a:t>
-            </a:r>
-            <a:endParaRPr lang="ru-RU" dirty="0"/>
-          </a:p>
-        </p:txBody>
-      </p:sp>
-    </p:spTree>
-    <p:extLst>
-      <p:ext uri="{BB962C8B-B14F-4D97-AF65-F5344CB8AC3E}">
-        <p14:creationId xmlns:p14="http://schemas.microsoft.com/office/powerpoint/2010/main" val="367650866"/>
-      </p:ext>
-    </p:extLst>
-  </p:cSld>
-  <p:clrMapOvr>
-    <a:masterClrMapping/>
-  </p:clrMapOvr>
-</p:sld>
-</file>
-
-<file path=ppt/slides/slide2.xml><?xml version="1.0" encoding="utf-8"?>
-<p:sld xmlns:a="http://schemas.openxmlformats.org/drawingml/2006/main" xmlns:r="http://schemas.openxmlformats.org/officeDocument/2006/relationships" xmlns:p="http://schemas.openxmlformats.org/presentationml/2006/main">
-  <p:cSld>
-    <p:spTree>
-      <p:nvGrpSpPr>
-        <p:cNvPr id="1" name=""/>
-        <p:cNvGrpSpPr/>
-        <p:nvPr/>
-      </p:nvGrpSpPr>
-      <p:grpSpPr>
-        <a:xfrm>
-          <a:off x="0" y="0"/>
-          <a:ext cx="0" cy="0"/>
-          <a:chOff x="0" y="0"/>
-          <a:chExt cx="0" cy="0"/>
-        </a:xfrm>
-      </p:grpSpPr>
-      <p:sp>
-        <p:nvSpPr>
-          <p:cNvPr id="2" name="Заголовок 1"/>
-          <p:cNvSpPr>
-            <a:spLocks noGrp="1"/>
-          </p:cNvSpPr>
-          <p:nvPr>
-            <p:ph type="title"/>
-          </p:nvPr>
-        </p:nvSpPr>
-        <p:spPr>
-          <a:xfrm>
-            <a:off x="838200" y="78687"/>
-            <a:ext cx="10515600" cy="582326"/>
-          </a:xfrm>
-        </p:spPr>
-        <p:txBody>
-          <a:bodyPr>
-            <a:normAutofit/>
-          </a:bodyPr>
-          <a:lstStyle/>
-          <a:p>
-            <a:pPr algn="ctr"/>
-            <a:r>
-              <a:rPr lang="ru-RU" sz="2400" b="1" dirty="0" smtClean="0"/>
-              <a:t>Уровни</a:t>
-            </a:r>
-            <a:endParaRPr lang="ru-RU" sz="2400" b="1" dirty="0"/>
-          </a:p>
-        </p:txBody>
-      </p:sp>
       <p:pic>
         <p:nvPicPr>
-          <p:cNvPr id="8" name="Объект 7"/>
-          <p:cNvPicPr>
-            <a:picLocks noGrp="1" noChangeAspect="1"/>
-          </p:cNvPicPr>
-          <p:nvPr>
-            <p:ph sz="half" idx="2"/>
-          </p:nvPr>
-        </p:nvPicPr>
-        <p:blipFill>
-          <a:blip r:embed="rId2"/>
-          <a:stretch>
-            <a:fillRect/>
-          </a:stretch>
-        </p:blipFill>
-        <p:spPr>
-          <a:xfrm>
-            <a:off x="2688117" y="499765"/>
-            <a:ext cx="9243152" cy="6278399"/>
-          </a:xfrm>
-          <a:prstGeom prst="rect">
-            <a:avLst/>
-          </a:prstGeom>
-        </p:spPr>
-      </p:pic>
-      <p:sp>
-        <p:nvSpPr>
-          <p:cNvPr id="7" name="Объект 6"/>
-          <p:cNvSpPr>
-            <a:spLocks noGrp="1"/>
-          </p:cNvSpPr>
-          <p:nvPr>
-            <p:ph sz="half" idx="1"/>
-          </p:nvPr>
-        </p:nvSpPr>
-        <p:spPr>
-          <a:xfrm>
-            <a:off x="112143" y="2034946"/>
-            <a:ext cx="2329132" cy="4351338"/>
-          </a:xfrm>
-        </p:spPr>
-        <p:txBody>
-          <a:bodyPr>
-            <a:normAutofit/>
-          </a:bodyPr>
-          <a:lstStyle/>
-          <a:p>
-            <a:pPr marL="0" indent="0">
-              <a:buNone/>
-            </a:pPr>
-            <a:r>
-              <a:rPr lang="ru-RU" sz="1600" b="1" dirty="0" smtClean="0"/>
-              <a:t>Количество пользователей  и групп на уровнях не ограничено</a:t>
-            </a:r>
-            <a:endParaRPr lang="ru-RU" sz="1600" b="1" dirty="0"/>
-          </a:p>
-        </p:txBody>
-      </p:sp>
-    </p:spTree>
-    <p:extLst>
-      <p:ext uri="{BB962C8B-B14F-4D97-AF65-F5344CB8AC3E}">
-        <p14:creationId xmlns:p14="http://schemas.microsoft.com/office/powerpoint/2010/main" val="1086564314"/>
-      </p:ext>
-    </p:extLst>
-  </p:cSld>
-  <p:clrMapOvr>
-    <a:masterClrMapping/>
-  </p:clrMapOvr>
-</p:sld>
-</file>
-
-<file path=ppt/slides/slide3.xml><?xml version="1.0" encoding="utf-8"?>
-<p:sld xmlns:a="http://schemas.openxmlformats.org/drawingml/2006/main" xmlns:r="http://schemas.openxmlformats.org/officeDocument/2006/relationships" xmlns:p="http://schemas.openxmlformats.org/presentationml/2006/main">
-  <p:cSld>
-    <p:spTree>
-      <p:nvGrpSpPr>
-        <p:cNvPr id="1" name=""/>
-        <p:cNvGrpSpPr/>
-        <p:nvPr/>
-      </p:nvGrpSpPr>
-      <p:grpSpPr>
-        <a:xfrm>
-          <a:off x="0" y="0"/>
-          <a:ext cx="0" cy="0"/>
-          <a:chOff x="0" y="0"/>
-          <a:chExt cx="0" cy="0"/>
-        </a:xfrm>
-      </p:grpSpPr>
-      <p:sp>
-        <p:nvSpPr>
-          <p:cNvPr id="2" name="Заголовок 1"/>
-          <p:cNvSpPr>
-            <a:spLocks noGrp="1"/>
-          </p:cNvSpPr>
-          <p:nvPr>
-            <p:ph type="title"/>
-          </p:nvPr>
-        </p:nvSpPr>
-        <p:spPr>
-          <a:xfrm>
-            <a:off x="762000" y="0"/>
-            <a:ext cx="10515600" cy="491706"/>
-          </a:xfrm>
-        </p:spPr>
-        <p:txBody>
-          <a:bodyPr>
-            <a:normAutofit/>
-          </a:bodyPr>
-          <a:lstStyle/>
-          <a:p>
-            <a:pPr algn="ctr"/>
-            <a:r>
-              <a:rPr lang="ru-RU" sz="2400" b="1" dirty="0" smtClean="0"/>
-              <a:t>Порядок действий администраторов</a:t>
-            </a:r>
-            <a:endParaRPr lang="ru-RU" sz="2400" b="1" dirty="0"/>
-          </a:p>
-        </p:txBody>
-      </p:sp>
-      <p:sp>
-        <p:nvSpPr>
-          <p:cNvPr id="3" name="Объект 2"/>
-          <p:cNvSpPr>
-            <a:spLocks noGrp="1"/>
-          </p:cNvSpPr>
-          <p:nvPr>
-            <p:ph sz="half" idx="1"/>
-          </p:nvPr>
-        </p:nvSpPr>
-        <p:spPr>
-          <a:xfrm>
-            <a:off x="88135" y="1013552"/>
-            <a:ext cx="4225073" cy="5563518"/>
-          </a:xfrm>
-        </p:spPr>
-        <p:txBody>
-          <a:bodyPr>
-            <a:normAutofit fontScale="62500" lnSpcReduction="20000"/>
-          </a:bodyPr>
-          <a:lstStyle/>
-          <a:p>
-            <a:r>
-              <a:rPr lang="ru-RU" dirty="0" smtClean="0"/>
-              <a:t>Пользователи с правами администратора добавляют нужных пользователей на странице администратора в разделе </a:t>
-            </a:r>
-            <a:r>
-              <a:rPr lang="ru-RU" dirty="0" smtClean="0"/>
-              <a:t>пользователи</a:t>
-            </a:r>
-            <a:r>
-              <a:rPr lang="en-US" dirty="0" smtClean="0"/>
-              <a:t> (</a:t>
-            </a:r>
-            <a:r>
-              <a:rPr lang="ru-RU" dirty="0" err="1" smtClean="0"/>
-              <a:t>кн</a:t>
-            </a:r>
-            <a:r>
-              <a:rPr lang="ru-RU" dirty="0" smtClean="0"/>
-              <a:t>-ка «Добавить пользователя), </a:t>
-            </a:r>
-            <a:r>
-              <a:rPr lang="ru-RU" dirty="0" smtClean="0"/>
-              <a:t>если они не зарегистрировались самостоятельно.</a:t>
-            </a:r>
-          </a:p>
-          <a:p>
-            <a:r>
-              <a:rPr lang="ru-RU" dirty="0" smtClean="0"/>
-              <a:t>Если пользователь зарегистрировался самостоятельно, то необходимо дать ему права </a:t>
-            </a:r>
-            <a:r>
-              <a:rPr lang="ru-RU" dirty="0" smtClean="0"/>
-              <a:t>администратора </a:t>
-            </a:r>
-            <a:r>
-              <a:rPr lang="en-US" dirty="0" smtClean="0"/>
-              <a:t>“admin”</a:t>
-            </a:r>
-            <a:r>
-              <a:rPr lang="ru-RU" dirty="0" smtClean="0"/>
-              <a:t>, </a:t>
-            </a:r>
-            <a:r>
-              <a:rPr lang="ru-RU" dirty="0" smtClean="0"/>
-              <a:t>если он таковым должен </a:t>
-            </a:r>
-            <a:r>
-              <a:rPr lang="ru-RU" dirty="0" smtClean="0"/>
-              <a:t>быть – ссылка «Править» в правой части таблицы у требуемого пользователя.</a:t>
-            </a:r>
-          </a:p>
-          <a:p>
-            <a:r>
-              <a:rPr lang="ru-RU" dirty="0" smtClean="0"/>
-              <a:t>Если добавляется обычный пользователь - исполнитель, который будет только вносить избирателей, то ему назначаются права </a:t>
-            </a:r>
-            <a:r>
-              <a:rPr lang="en-US" dirty="0" smtClean="0"/>
-              <a:t>“user”.</a:t>
-            </a:r>
-            <a:endParaRPr lang="ru-RU" dirty="0" smtClean="0"/>
-          </a:p>
-          <a:p>
-            <a:r>
-              <a:rPr lang="ru-RU" dirty="0" smtClean="0"/>
-              <a:t>Самостоятельно зарегистрировавшиеся пользователи по умолчанию являются обычными пользователями</a:t>
-            </a:r>
-            <a:r>
-              <a:rPr lang="ru-RU" dirty="0" smtClean="0"/>
-              <a:t>.</a:t>
-            </a:r>
-            <a:endParaRPr lang="ru-RU" dirty="0" smtClean="0"/>
-          </a:p>
-        </p:txBody>
-      </p:sp>
-      <p:sp>
-        <p:nvSpPr>
-          <p:cNvPr id="4" name="Объект 3"/>
-          <p:cNvSpPr>
-            <a:spLocks noGrp="1"/>
-          </p:cNvSpPr>
-          <p:nvPr>
-            <p:ph sz="half" idx="2"/>
-          </p:nvPr>
-        </p:nvSpPr>
-        <p:spPr>
-          <a:xfrm>
-            <a:off x="4139961" y="764931"/>
-            <a:ext cx="7962900" cy="5998177"/>
-          </a:xfrm>
-        </p:spPr>
-        <p:txBody>
-          <a:bodyPr>
-            <a:normAutofit fontScale="62500" lnSpcReduction="20000"/>
-          </a:bodyPr>
-          <a:lstStyle/>
-          <a:p>
-            <a:endParaRPr lang="ru-RU" dirty="0"/>
-          </a:p>
-        </p:txBody>
-      </p:sp>
-      <p:pic>
-        <p:nvPicPr>
-          <p:cNvPr id="1027" name="Picture 3"/>
+          <p:cNvPr id="1026" name="Picture 2"/>
           <p:cNvPicPr>
             <a:picLocks noChangeAspect="1" noChangeArrowheads="1"/>
           </p:cNvPicPr>
           <p:nvPr/>
         </p:nvPicPr>
         <p:blipFill>
-          <a:blip r:embed="rId2">
+          <a:blip r:embed="rId4">
             <a:extLst>
               <a:ext uri="{28A0092B-C50C-407E-A947-70E740481C1C}">
                 <a14:useLocalDpi xmlns:a14="http://schemas.microsoft.com/office/drawing/2010/main" val="0"/>
@@ -3856,8 +3407,8 @@
         </p:blipFill>
         <p:spPr bwMode="auto">
           <a:xfrm>
-            <a:off x="4139960" y="408109"/>
-            <a:ext cx="7904492" cy="3231671"/>
+            <a:off x="6604183" y="2806573"/>
+            <a:ext cx="5587816" cy="3515429"/>
           </a:xfrm>
           <a:prstGeom prst="rect">
             <a:avLst/>
@@ -3897,16 +3448,154 @@
           </a:extLst>
         </p:spPr>
       </p:pic>
+    </p:spTree>
+    <p:extLst>
+      <p:ext uri="{BB962C8B-B14F-4D97-AF65-F5344CB8AC3E}">
+        <p14:creationId xmlns:p14="http://schemas.microsoft.com/office/powerpoint/2010/main" val="2621913975"/>
+      </p:ext>
+    </p:extLst>
+  </p:cSld>
+  <p:clrMapOvr>
+    <a:masterClrMapping/>
+  </p:clrMapOvr>
+</p:sld>
+</file>
+
+<file path=ppt/slides/slide11.xml><?xml version="1.0" encoding="utf-8"?>
+<p:sld xmlns:a="http://schemas.openxmlformats.org/drawingml/2006/main" xmlns:r="http://schemas.openxmlformats.org/officeDocument/2006/relationships" xmlns:p="http://schemas.openxmlformats.org/presentationml/2006/main">
+  <p:cSld>
+    <p:spTree>
+      <p:nvGrpSpPr>
+        <p:cNvPr id="1" name=""/>
+        <p:cNvGrpSpPr/>
+        <p:nvPr/>
+      </p:nvGrpSpPr>
+      <p:grpSpPr>
+        <a:xfrm>
+          <a:off x="0" y="0"/>
+          <a:ext cx="0" cy="0"/>
+          <a:chOff x="0" y="0"/>
+          <a:chExt cx="0" cy="0"/>
+        </a:xfrm>
+      </p:grpSpPr>
+      <p:sp>
+        <p:nvSpPr>
+          <p:cNvPr id="2" name="Заголовок 1"/>
+          <p:cNvSpPr>
+            <a:spLocks noGrp="1"/>
+          </p:cNvSpPr>
+          <p:nvPr>
+            <p:ph type="title"/>
+          </p:nvPr>
+        </p:nvSpPr>
+        <p:spPr>
+          <a:xfrm>
+            <a:off x="838200" y="60386"/>
+            <a:ext cx="10515600" cy="664234"/>
+          </a:xfrm>
+        </p:spPr>
+        <p:txBody>
+          <a:bodyPr>
+            <a:normAutofit/>
+          </a:bodyPr>
+          <a:lstStyle/>
+          <a:p>
+            <a:pPr algn="ctr"/>
+            <a:r>
+              <a:rPr lang="ru-RU" sz="2400" b="1" dirty="0"/>
+              <a:t>Загрузка из файлов</a:t>
+            </a:r>
+          </a:p>
+        </p:txBody>
+      </p:sp>
+      <p:sp>
+        <p:nvSpPr>
+          <p:cNvPr id="3" name="Объект 2"/>
+          <p:cNvSpPr>
+            <a:spLocks noGrp="1"/>
+          </p:cNvSpPr>
+          <p:nvPr>
+            <p:ph sz="half" idx="1"/>
+          </p:nvPr>
+        </p:nvSpPr>
+        <p:spPr>
+          <a:xfrm>
+            <a:off x="0" y="750498"/>
+            <a:ext cx="3277705" cy="6107501"/>
+          </a:xfrm>
+        </p:spPr>
+        <p:txBody>
+          <a:bodyPr>
+            <a:normAutofit fontScale="92500" lnSpcReduction="10000"/>
+          </a:bodyPr>
+          <a:lstStyle/>
+          <a:p>
+            <a:r>
+              <a:rPr lang="ru-RU" sz="2000" dirty="0" smtClean="0"/>
+              <a:t>В личном кабинете пользователя есть возможность загрузить данные из файлов «.</a:t>
+            </a:r>
+            <a:r>
+              <a:rPr lang="en-US" sz="2000" dirty="0" err="1" smtClean="0"/>
+              <a:t>xls</a:t>
+            </a:r>
+            <a:r>
+              <a:rPr lang="ru-RU" sz="2000" dirty="0" smtClean="0"/>
+              <a:t>»</a:t>
+            </a:r>
+            <a:r>
+              <a:rPr lang="en-US" sz="2000" dirty="0" smtClean="0"/>
+              <a:t> </a:t>
+            </a:r>
+            <a:r>
+              <a:rPr lang="ru-RU" sz="2000" dirty="0" smtClean="0"/>
+              <a:t>установленного формата. Названия населенных пунктов, улиц, домов, сферы деятельности, должно строго соответствовать наименованиям данных категорий в сервисе для корректной загрузки.</a:t>
+            </a:r>
+          </a:p>
+          <a:p>
+            <a:r>
+              <a:rPr lang="ru-RU" sz="2000" dirty="0" smtClean="0"/>
+              <a:t>Если адрес в файле указан верно и данному адресу в сервисе соответствует избирательный участок, то участок загрузится в соответствии с указанным адресом. Иначе будет произведена попытка поиска нужного участка по номеру указанному в файле. Иначе строка не будет загружена.</a:t>
+            </a:r>
+            <a:endParaRPr lang="ru-RU" sz="2000" dirty="0"/>
+          </a:p>
+        </p:txBody>
+      </p:sp>
+      <p:sp>
+        <p:nvSpPr>
+          <p:cNvPr id="4" name="Объект 3"/>
+          <p:cNvSpPr>
+            <a:spLocks noGrp="1"/>
+          </p:cNvSpPr>
+          <p:nvPr>
+            <p:ph sz="half" idx="2"/>
+          </p:nvPr>
+        </p:nvSpPr>
+        <p:spPr>
+          <a:xfrm>
+            <a:off x="3174023" y="793631"/>
+            <a:ext cx="8928837" cy="5960852"/>
+          </a:xfrm>
+        </p:spPr>
+        <p:txBody>
+          <a:bodyPr>
+            <a:normAutofit fontScale="92500" lnSpcReduction="10000"/>
+          </a:bodyPr>
+          <a:lstStyle/>
+          <a:p>
+            <a:endParaRPr lang="ru-RU" dirty="0"/>
+          </a:p>
+        </p:txBody>
+      </p:sp>
       <p:pic>
         <p:nvPicPr>
-          <p:cNvPr id="1028" name="Picture 4"/>
+          <p:cNvPr id="2050" name="Picture 2"/>
           <p:cNvPicPr>
             <a:picLocks noChangeAspect="1" noChangeArrowheads="1"/>
           </p:cNvPicPr>
           <p:nvPr/>
         </p:nvPicPr>
         <p:blipFill>
-          <a:blip r:embed="rId3" cstate="print">
+          <a:blip r:embed="rId2">
             <a:extLst>
               <a:ext uri="{28A0092B-C50C-407E-A947-70E740481C1C}">
                 <a14:useLocalDpi xmlns:a14="http://schemas.microsoft.com/office/drawing/2010/main" val="0"/>
@@ -3920,8 +3609,8 @@
         </p:blipFill>
         <p:spPr bwMode="auto">
           <a:xfrm>
-            <a:off x="9566694" y="3639780"/>
-            <a:ext cx="2562045" cy="3115366"/>
+            <a:off x="3277705" y="1440612"/>
+            <a:ext cx="8811399" cy="3996034"/>
           </a:xfrm>
           <a:prstGeom prst="rect">
             <a:avLst/>
@@ -3961,16 +3650,125 @@
           </a:extLst>
         </p:spPr>
       </p:pic>
+    </p:spTree>
+    <p:extLst>
+      <p:ext uri="{BB962C8B-B14F-4D97-AF65-F5344CB8AC3E}">
+        <p14:creationId xmlns:p14="http://schemas.microsoft.com/office/powerpoint/2010/main" val="2778114306"/>
+      </p:ext>
+    </p:extLst>
+  </p:cSld>
+  <p:clrMapOvr>
+    <a:masterClrMapping/>
+  </p:clrMapOvr>
+</p:sld>
+</file>
+
+<file path=ppt/slides/slide12.xml><?xml version="1.0" encoding="utf-8"?>
+<p:sld xmlns:a="http://schemas.openxmlformats.org/drawingml/2006/main" xmlns:r="http://schemas.openxmlformats.org/officeDocument/2006/relationships" xmlns:p="http://schemas.openxmlformats.org/presentationml/2006/main">
+  <p:cSld>
+    <p:spTree>
+      <p:nvGrpSpPr>
+        <p:cNvPr id="1" name=""/>
+        <p:cNvGrpSpPr/>
+        <p:nvPr/>
+      </p:nvGrpSpPr>
+      <p:grpSpPr>
+        <a:xfrm>
+          <a:off x="0" y="0"/>
+          <a:ext cx="0" cy="0"/>
+          <a:chOff x="0" y="0"/>
+          <a:chExt cx="0" cy="0"/>
+        </a:xfrm>
+      </p:grpSpPr>
+      <p:sp>
+        <p:nvSpPr>
+          <p:cNvPr id="2" name="Заголовок 1"/>
+          <p:cNvSpPr>
+            <a:spLocks noGrp="1"/>
+          </p:cNvSpPr>
+          <p:nvPr>
+            <p:ph type="title"/>
+          </p:nvPr>
+        </p:nvSpPr>
+        <p:spPr>
+          <a:xfrm>
+            <a:off x="838200" y="365126"/>
+            <a:ext cx="10515600" cy="566528"/>
+          </a:xfrm>
+        </p:spPr>
+        <p:txBody>
+          <a:bodyPr>
+            <a:normAutofit/>
+          </a:bodyPr>
+          <a:lstStyle/>
+          <a:p>
+            <a:pPr algn="ctr"/>
+            <a:r>
+              <a:rPr lang="ru-RU" sz="2400" b="1" dirty="0" smtClean="0"/>
+              <a:t>УИК</a:t>
+            </a:r>
+            <a:endParaRPr lang="ru-RU" sz="2400" b="1" dirty="0"/>
+          </a:p>
+        </p:txBody>
+      </p:sp>
+      <p:sp>
+        <p:nvSpPr>
+          <p:cNvPr id="3" name="Объект 2"/>
+          <p:cNvSpPr>
+            <a:spLocks noGrp="1"/>
+          </p:cNvSpPr>
+          <p:nvPr>
+            <p:ph idx="1"/>
+          </p:nvPr>
+        </p:nvSpPr>
+        <p:spPr>
+          <a:xfrm>
+            <a:off x="319177" y="2104845"/>
+            <a:ext cx="8186468" cy="3291020"/>
+          </a:xfrm>
+        </p:spPr>
+        <p:txBody>
+          <a:bodyPr>
+            <a:normAutofit/>
+          </a:bodyPr>
+          <a:lstStyle/>
+          <a:p>
+            <a:r>
+              <a:rPr lang="ru-RU" sz="2000" dirty="0" smtClean="0"/>
+              <a:t>На станицы добавления избирателя, при наличии всех необходимых данных об адресе и УИК в базе данных, список УИК-</a:t>
+            </a:r>
+            <a:r>
+              <a:rPr lang="ru-RU" sz="2000" dirty="0" err="1" smtClean="0"/>
+              <a:t>ов</a:t>
+            </a:r>
+            <a:r>
+              <a:rPr lang="ru-RU" sz="2000" dirty="0" smtClean="0"/>
+              <a:t> будет обновляться динамически по мере выбора пользователем населенного пункта, затем улицы, при выборе дома останется 1-н УИК относящейся к данному дому. При этом пользователь может выбрать УИК и на стадии выбора улицы (будут выданы УИК относящиеся к выбранной улице), если дом не </a:t>
+            </a:r>
+            <a:r>
+              <a:rPr lang="ru-RU" sz="2000" dirty="0" smtClean="0"/>
+              <a:t>известен</a:t>
+            </a:r>
+          </a:p>
+          <a:p>
+            <a:r>
+              <a:rPr lang="ru-RU" sz="2000" dirty="0" smtClean="0"/>
+              <a:t>После определения УИК-а будет автоматически определен и избирательный округ.</a:t>
+            </a:r>
+            <a:endParaRPr lang="ru-RU" sz="2000" dirty="0"/>
+          </a:p>
+        </p:txBody>
+      </p:sp>
       <p:pic>
         <p:nvPicPr>
-          <p:cNvPr id="1029" name="Picture 5"/>
+          <p:cNvPr id="2050" name="Picture 2"/>
           <p:cNvPicPr>
             <a:picLocks noChangeAspect="1" noChangeArrowheads="1"/>
           </p:cNvPicPr>
           <p:nvPr/>
         </p:nvPicPr>
         <p:blipFill>
-          <a:blip r:embed="rId4">
+          <a:blip r:embed="rId2">
             <a:extLst>
               <a:ext uri="{28A0092B-C50C-407E-A947-70E740481C1C}">
                 <a14:useLocalDpi xmlns:a14="http://schemas.microsoft.com/office/drawing/2010/main" val="0"/>
@@ -3984,8 +3782,8 @@
         </p:blipFill>
         <p:spPr bwMode="auto">
           <a:xfrm>
-            <a:off x="4289569" y="3639780"/>
-            <a:ext cx="4975201" cy="1927285"/>
+            <a:off x="9221868" y="470779"/>
+            <a:ext cx="1803792" cy="6222749"/>
           </a:xfrm>
           <a:prstGeom prst="rect">
             <a:avLst/>
@@ -4028,7 +3826,7 @@
     </p:spTree>
     <p:extLst>
       <p:ext uri="{BB962C8B-B14F-4D97-AF65-F5344CB8AC3E}">
-        <p14:creationId xmlns:p14="http://schemas.microsoft.com/office/powerpoint/2010/main" val="3098054136"/>
+        <p14:creationId xmlns:p14="http://schemas.microsoft.com/office/powerpoint/2010/main" val="2688907311"/>
       </p:ext>
     </p:extLst>
   </p:cSld>
@@ -4038,7 +3836,7 @@
 </p:sld>
 </file>
 
-<file path=ppt/slides/slide4.xml><?xml version="1.0" encoding="utf-8"?>
+<file path=ppt/slides/slide13.xml><?xml version="1.0" encoding="utf-8"?>
 <p:sld xmlns:a="http://schemas.openxmlformats.org/drawingml/2006/main" xmlns:r="http://schemas.openxmlformats.org/officeDocument/2006/relationships" xmlns:p="http://schemas.openxmlformats.org/presentationml/2006/main">
   <p:cSld>
     <p:spTree>
@@ -4067,8 +3865,8 @@
         </p:nvSpPr>
         <p:spPr>
           <a:xfrm>
-            <a:off x="661930" y="1"/>
-            <a:ext cx="10515600" cy="561860"/>
+            <a:off x="838200" y="365126"/>
+            <a:ext cx="10515600" cy="592406"/>
           </a:xfrm>
         </p:spPr>
         <p:txBody>
@@ -4079,10 +3877,215 @@
           <a:p>
             <a:pPr algn="ctr"/>
             <a:r>
-              <a:rPr lang="ru-RU" sz="2400" b="1" dirty="0"/>
+              <a:rPr lang="ru-RU" sz="2400" b="1" dirty="0" smtClean="0"/>
+              <a:t>Мобильная версия</a:t>
+            </a:r>
+            <a:endParaRPr lang="ru-RU" sz="2400" b="1" dirty="0"/>
+          </a:p>
+        </p:txBody>
+      </p:sp>
+      <p:sp>
+        <p:nvSpPr>
+          <p:cNvPr id="3" name="Объект 2"/>
+          <p:cNvSpPr>
+            <a:spLocks noGrp="1"/>
+          </p:cNvSpPr>
+          <p:nvPr>
+            <p:ph idx="1"/>
+          </p:nvPr>
+        </p:nvSpPr>
+        <p:spPr/>
+        <p:txBody>
+          <a:bodyPr/>
+          <a:lstStyle/>
+          <a:p>
+            <a:pPr algn="ctr"/>
+            <a:r>
+              <a:rPr lang="ru-RU" dirty="0" smtClean="0"/>
+              <a:t>Доступна мобильная версия</a:t>
+            </a:r>
+            <a:endParaRPr lang="ru-RU" dirty="0"/>
+          </a:p>
+        </p:txBody>
+      </p:sp>
+    </p:spTree>
+    <p:extLst>
+      <p:ext uri="{BB962C8B-B14F-4D97-AF65-F5344CB8AC3E}">
+        <p14:creationId xmlns:p14="http://schemas.microsoft.com/office/powerpoint/2010/main" val="367650866"/>
+      </p:ext>
+    </p:extLst>
+  </p:cSld>
+  <p:clrMapOvr>
+    <a:masterClrMapping/>
+  </p:clrMapOvr>
+</p:sld>
+</file>
+
+<file path=ppt/slides/slide2.xml><?xml version="1.0" encoding="utf-8"?>
+<p:sld xmlns:a="http://schemas.openxmlformats.org/drawingml/2006/main" xmlns:r="http://schemas.openxmlformats.org/officeDocument/2006/relationships" xmlns:p="http://schemas.openxmlformats.org/presentationml/2006/main">
+  <p:cSld>
+    <p:spTree>
+      <p:nvGrpSpPr>
+        <p:cNvPr id="1" name=""/>
+        <p:cNvGrpSpPr/>
+        <p:nvPr/>
+      </p:nvGrpSpPr>
+      <p:grpSpPr>
+        <a:xfrm>
+          <a:off x="0" y="0"/>
+          <a:ext cx="0" cy="0"/>
+          <a:chOff x="0" y="0"/>
+          <a:chExt cx="0" cy="0"/>
+        </a:xfrm>
+      </p:grpSpPr>
+      <p:sp>
+        <p:nvSpPr>
+          <p:cNvPr id="2" name="Заголовок 1"/>
+          <p:cNvSpPr>
+            <a:spLocks noGrp="1"/>
+          </p:cNvSpPr>
+          <p:nvPr>
+            <p:ph type="title"/>
+          </p:nvPr>
+        </p:nvSpPr>
+        <p:spPr>
+          <a:xfrm>
+            <a:off x="838200" y="78687"/>
+            <a:ext cx="10515600" cy="582326"/>
+          </a:xfrm>
+        </p:spPr>
+        <p:txBody>
+          <a:bodyPr>
+            <a:normAutofit/>
+          </a:bodyPr>
+          <a:lstStyle/>
+          <a:p>
+            <a:pPr algn="ctr"/>
+            <a:r>
+              <a:rPr lang="ru-RU" sz="2400" b="1" dirty="0" smtClean="0"/>
+              <a:t>Уровни</a:t>
+            </a:r>
+            <a:endParaRPr lang="ru-RU" sz="2400" b="1" dirty="0"/>
+          </a:p>
+        </p:txBody>
+      </p:sp>
+      <p:pic>
+        <p:nvPicPr>
+          <p:cNvPr id="8" name="Объект 7"/>
+          <p:cNvPicPr>
+            <a:picLocks noGrp="1" noChangeAspect="1"/>
+          </p:cNvPicPr>
+          <p:nvPr>
+            <p:ph sz="half" idx="2"/>
+          </p:nvPr>
+        </p:nvPicPr>
+        <p:blipFill>
+          <a:blip r:embed="rId2"/>
+          <a:stretch>
+            <a:fillRect/>
+          </a:stretch>
+        </p:blipFill>
+        <p:spPr>
+          <a:xfrm>
+            <a:off x="2688117" y="499765"/>
+            <a:ext cx="9243152" cy="6278399"/>
+          </a:xfrm>
+          <a:prstGeom prst="rect">
+            <a:avLst/>
+          </a:prstGeom>
+        </p:spPr>
+      </p:pic>
+      <p:sp>
+        <p:nvSpPr>
+          <p:cNvPr id="7" name="Объект 6"/>
+          <p:cNvSpPr>
+            <a:spLocks noGrp="1"/>
+          </p:cNvSpPr>
+          <p:nvPr>
+            <p:ph sz="half" idx="1"/>
+          </p:nvPr>
+        </p:nvSpPr>
+        <p:spPr>
+          <a:xfrm>
+            <a:off x="112143" y="2034946"/>
+            <a:ext cx="2329132" cy="4351338"/>
+          </a:xfrm>
+        </p:spPr>
+        <p:txBody>
+          <a:bodyPr>
+            <a:normAutofit/>
+          </a:bodyPr>
+          <a:lstStyle/>
+          <a:p>
+            <a:pPr marL="0" indent="0">
+              <a:buNone/>
+            </a:pPr>
+            <a:r>
+              <a:rPr lang="ru-RU" sz="1600" b="1" dirty="0" smtClean="0"/>
+              <a:t>Количество пользователей  и групп на уровнях не ограничено</a:t>
+            </a:r>
+            <a:endParaRPr lang="ru-RU" sz="1600" b="1" dirty="0"/>
+          </a:p>
+        </p:txBody>
+      </p:sp>
+    </p:spTree>
+    <p:extLst>
+      <p:ext uri="{BB962C8B-B14F-4D97-AF65-F5344CB8AC3E}">
+        <p14:creationId xmlns:p14="http://schemas.microsoft.com/office/powerpoint/2010/main" val="1086564314"/>
+      </p:ext>
+    </p:extLst>
+  </p:cSld>
+  <p:clrMapOvr>
+    <a:masterClrMapping/>
+  </p:clrMapOvr>
+</p:sld>
+</file>
+
+<file path=ppt/slides/slide3.xml><?xml version="1.0" encoding="utf-8"?>
+<p:sld xmlns:a="http://schemas.openxmlformats.org/drawingml/2006/main" xmlns:r="http://schemas.openxmlformats.org/officeDocument/2006/relationships" xmlns:p="http://schemas.openxmlformats.org/presentationml/2006/main">
+  <p:cSld>
+    <p:spTree>
+      <p:nvGrpSpPr>
+        <p:cNvPr id="1" name=""/>
+        <p:cNvGrpSpPr/>
+        <p:nvPr/>
+      </p:nvGrpSpPr>
+      <p:grpSpPr>
+        <a:xfrm>
+          <a:off x="0" y="0"/>
+          <a:ext cx="0" cy="0"/>
+          <a:chOff x="0" y="0"/>
+          <a:chExt cx="0" cy="0"/>
+        </a:xfrm>
+      </p:grpSpPr>
+      <p:sp>
+        <p:nvSpPr>
+          <p:cNvPr id="2" name="Заголовок 1"/>
+          <p:cNvSpPr>
+            <a:spLocks noGrp="1"/>
+          </p:cNvSpPr>
+          <p:nvPr>
+            <p:ph type="title"/>
+          </p:nvPr>
+        </p:nvSpPr>
+        <p:spPr>
+          <a:xfrm>
+            <a:off x="762000" y="0"/>
+            <a:ext cx="10515600" cy="491706"/>
+          </a:xfrm>
+        </p:spPr>
+        <p:txBody>
+          <a:bodyPr>
+            <a:normAutofit/>
+          </a:bodyPr>
+          <a:lstStyle/>
+          <a:p>
+            <a:pPr algn="ctr"/>
+            <a:r>
+              <a:rPr lang="ru-RU" sz="2400" b="1" dirty="0" smtClean="0"/>
               <a:t>Порядок действий администраторов</a:t>
             </a:r>
-            <a:endParaRPr lang="ru-RU" sz="2400" dirty="0"/>
+            <a:endParaRPr lang="ru-RU" sz="2400" b="1" dirty="0"/>
           </a:p>
         </p:txBody>
       </p:sp>
@@ -4098,8 +4101,8 @@
         </p:nvSpPr>
         <p:spPr>
           <a:xfrm>
-            <a:off x="22953" y="508958"/>
-            <a:ext cx="3306842" cy="5934974"/>
+            <a:off x="88135" y="1013552"/>
+            <a:ext cx="4225073" cy="5563518"/>
           </a:xfrm>
         </p:spPr>
         <p:txBody>
@@ -4110,27 +4113,51 @@
           <a:p>
             <a:r>
               <a:rPr lang="ru-RU" dirty="0" smtClean="0"/>
-              <a:t>Пользователи с правами администратора </a:t>
+              <a:t>Пользователи с правами администратора добавляют нужных пользователей на странице администратора в разделе пользователи</a:t>
+            </a:r>
+            <a:r>
+              <a:rPr lang="en-US" dirty="0" smtClean="0"/>
+              <a:t> (</a:t>
+            </a:r>
+            <a:r>
+              <a:rPr lang="ru-RU" dirty="0" err="1" smtClean="0"/>
+              <a:t>кн</a:t>
             </a:r>
             <a:r>
               <a:rPr lang="ru-RU" dirty="0" smtClean="0"/>
-              <a:t>на странице администратора </a:t>
-            </a:r>
+              <a:t>-ка «Добавить пользователя), если они не зарегистрировались самостоятельно.</a:t>
+            </a:r>
+          </a:p>
+          <a:p>
             <a:r>
               <a:rPr lang="ru-RU" dirty="0" smtClean="0"/>
-              <a:t>могут создавать новые группы. Новые группы следует создавать только при наличии крупных подразделений, за которыми закрепляется отдельный ответственный с правами администратора.</a:t>
-            </a:r>
-          </a:p>
-          <a:p>
+              <a:t>Если пользователь зарегистрировался самостоятельно, то необходимо дать ему права администратора </a:t>
+            </a:r>
+            <a:r>
+              <a:rPr lang="en-US" dirty="0" smtClean="0"/>
+              <a:t>“admin”</a:t>
+            </a:r>
             <a:r>
               <a:rPr lang="ru-RU" dirty="0" smtClean="0"/>
-              <a:t> </a:t>
-            </a:r>
-            <a:r>
-              <a:rPr lang="ru-RU" b="1" dirty="0" smtClean="0"/>
-              <a:t>При создании новой группы, ответственный за её создание должен обязательно включить всех ответственных, стоящих над ним по структуре, (руководителей) зарегистрированных в сервисе в данную группу, что бы они могли видеть избирателей, которые будут добавляться в эти группы (вкладка «Группы пользователей).</a:t>
-            </a:r>
-            <a:endParaRPr lang="ru-RU" b="1" dirty="0"/>
+              <a:t>, если он таковым должен быть – ссылка «Править» в правой части таблицы у требуемого пользователя.</a:t>
+            </a:r>
+          </a:p>
+          <a:p>
+            <a:r>
+              <a:rPr lang="ru-RU" dirty="0" smtClean="0"/>
+              <a:t>Если добавляется обычный пользователь - исполнитель, который будет только вносить избирателей, то ему назначаются права </a:t>
+            </a:r>
+            <a:r>
+              <a:rPr lang="en-US" dirty="0" smtClean="0"/>
+              <a:t>“user”.</a:t>
+            </a:r>
+            <a:endParaRPr lang="ru-RU" dirty="0" smtClean="0"/>
+          </a:p>
+          <a:p>
+            <a:r>
+              <a:rPr lang="ru-RU" dirty="0" smtClean="0"/>
+              <a:t>Самостоятельно зарегистрировавшиеся пользователи по умолчанию являются обычными пользователями.</a:t>
+            </a:r>
           </a:p>
         </p:txBody>
       </p:sp>
@@ -4146,8 +4173,8 @@
         </p:nvSpPr>
         <p:spPr>
           <a:xfrm>
-            <a:off x="3372928" y="422694"/>
-            <a:ext cx="8678174" cy="6314536"/>
+            <a:off x="4139961" y="764931"/>
+            <a:ext cx="7962900" cy="5998177"/>
           </a:xfrm>
         </p:spPr>
         <p:txBody>
@@ -4162,7 +4189,7 @@
       </p:sp>
       <p:pic>
         <p:nvPicPr>
-          <p:cNvPr id="2050" name="Picture 2"/>
+          <p:cNvPr id="1027" name="Picture 3"/>
           <p:cNvPicPr>
             <a:picLocks noChangeAspect="1" noChangeArrowheads="1"/>
           </p:cNvPicPr>
@@ -4183,8 +4210,8 @@
         </p:blipFill>
         <p:spPr bwMode="auto">
           <a:xfrm>
-            <a:off x="3329795" y="508958"/>
-            <a:ext cx="5149971" cy="3064398"/>
+            <a:off x="4139960" y="408109"/>
+            <a:ext cx="7904492" cy="3231671"/>
           </a:xfrm>
           <a:prstGeom prst="rect">
             <a:avLst/>
@@ -4226,14 +4253,14 @@
       </p:pic>
       <p:pic>
         <p:nvPicPr>
-          <p:cNvPr id="2051" name="Picture 3"/>
+          <p:cNvPr id="1028" name="Picture 4"/>
           <p:cNvPicPr>
             <a:picLocks noChangeAspect="1" noChangeArrowheads="1"/>
           </p:cNvPicPr>
           <p:nvPr/>
         </p:nvPicPr>
         <p:blipFill>
-          <a:blip r:embed="rId3">
+          <a:blip r:embed="rId3" cstate="print">
             <a:extLst>
               <a:ext uri="{28A0092B-C50C-407E-A947-70E740481C1C}">
                 <a14:useLocalDpi xmlns:a14="http://schemas.microsoft.com/office/drawing/2010/main" val="0"/>
@@ -4247,8 +4274,8 @@
         </p:blipFill>
         <p:spPr bwMode="auto">
           <a:xfrm>
-            <a:off x="8603410" y="508958"/>
-            <a:ext cx="2743543" cy="3153293"/>
+            <a:off x="9566694" y="3639780"/>
+            <a:ext cx="2562045" cy="3115366"/>
           </a:xfrm>
           <a:prstGeom prst="rect">
             <a:avLst/>
@@ -4290,7 +4317,7 @@
       </p:pic>
       <p:pic>
         <p:nvPicPr>
-          <p:cNvPr id="2052" name="Picture 4"/>
+          <p:cNvPr id="1029" name="Picture 5"/>
           <p:cNvPicPr>
             <a:picLocks noChangeAspect="1" noChangeArrowheads="1"/>
           </p:cNvPicPr>
@@ -4311,8 +4338,8 @@
         </p:blipFill>
         <p:spPr bwMode="auto">
           <a:xfrm>
-            <a:off x="4002657" y="3760233"/>
-            <a:ext cx="7557998" cy="2534775"/>
+            <a:off x="4289569" y="3639780"/>
+            <a:ext cx="4975201" cy="1927285"/>
           </a:xfrm>
           <a:prstGeom prst="rect">
             <a:avLst/>
@@ -4355,7 +4382,7 @@
     </p:spTree>
     <p:extLst>
       <p:ext uri="{BB962C8B-B14F-4D97-AF65-F5344CB8AC3E}">
-        <p14:creationId xmlns:p14="http://schemas.microsoft.com/office/powerpoint/2010/main" val="1378234309"/>
+        <p14:creationId xmlns:p14="http://schemas.microsoft.com/office/powerpoint/2010/main" val="3098054136"/>
       </p:ext>
     </p:extLst>
   </p:cSld>
@@ -4365,7 +4392,7 @@
 </p:sld>
 </file>
 
-<file path=ppt/slides/slide5.xml><?xml version="1.0" encoding="utf-8"?>
+<file path=ppt/slides/slide4.xml><?xml version="1.0" encoding="utf-8"?>
 <p:sld xmlns:a="http://schemas.openxmlformats.org/drawingml/2006/main" xmlns:r="http://schemas.openxmlformats.org/officeDocument/2006/relationships" xmlns:p="http://schemas.openxmlformats.org/presentationml/2006/main">
   <p:cSld>
     <p:spTree>
@@ -4394,8 +4421,8 @@
         </p:nvSpPr>
         <p:spPr>
           <a:xfrm>
-            <a:off x="606846" y="1"/>
-            <a:ext cx="10515600" cy="517584"/>
+            <a:off x="661930" y="1"/>
+            <a:ext cx="10515600" cy="561860"/>
           </a:xfrm>
         </p:spPr>
         <p:txBody>
@@ -4425,134 +4452,63 @@
         </p:nvSpPr>
         <p:spPr>
           <a:xfrm>
-            <a:off x="44986" y="616944"/>
-            <a:ext cx="4813453" cy="6147413"/>
+            <a:off x="22953" y="508958"/>
+            <a:ext cx="3306842" cy="5934974"/>
           </a:xfrm>
         </p:spPr>
         <p:txBody>
           <a:bodyPr>
-            <a:normAutofit fontScale="85000" lnSpcReduction="20000"/>
+            <a:normAutofit fontScale="62500" lnSpcReduction="20000"/>
           </a:bodyPr>
           <a:lstStyle/>
           <a:p>
             <a:r>
               <a:rPr lang="ru-RU" dirty="0" smtClean="0"/>
-              <a:t>Пользователи/пользователь </a:t>
-            </a:r>
-            <a:r>
-              <a:rPr lang="ru-RU" dirty="0"/>
-              <a:t>с правами </a:t>
-            </a:r>
+              <a:t>Пользователи с правами администратора на странице администратора могут создавать новые группы. Новые группы следует создавать только при наличии крупных подразделений, за которыми закрепляется отдельный ответственный с правами администратора.</a:t>
+            </a:r>
+          </a:p>
+          <a:p>
             <a:r>
               <a:rPr lang="ru-RU" dirty="0" smtClean="0"/>
-              <a:t>администратора, создавший требуемую группу/группы, </a:t>
-            </a:r>
-            <a:r>
-              <a:rPr lang="ru-RU" dirty="0" smtClean="0"/>
-              <a:t>добавляет </a:t>
-            </a:r>
-            <a:r>
-              <a:rPr lang="ru-RU" dirty="0" smtClean="0"/>
-              <a:t>всех нужных </a:t>
-            </a:r>
-            <a:r>
-              <a:rPr lang="ru-RU" dirty="0" smtClean="0"/>
-              <a:t>пользователей </a:t>
-            </a:r>
-            <a:r>
-              <a:rPr lang="ru-RU" dirty="0" smtClean="0"/>
-              <a:t>(</a:t>
+              <a:t> </a:t>
             </a:r>
             <a:r>
               <a:rPr lang="ru-RU" b="1" dirty="0" smtClean="0"/>
-              <a:t>в </a:t>
-            </a:r>
-            <a:r>
-              <a:rPr lang="ru-RU" b="1" dirty="0" err="1" smtClean="0"/>
-              <a:t>т.ч</a:t>
+              <a:t>При создании новой группы, ответственный за её создание должен обязательно включить всех ответственных, стоящих над ним по </a:t>
             </a:r>
             <a:r>
               <a:rPr lang="ru-RU" b="1" dirty="0" smtClean="0"/>
-              <a:t>. </a:t>
-            </a:r>
-            <a:r>
-              <a:rPr lang="ru-RU" b="1" dirty="0"/>
-              <a:t>в</a:t>
+              <a:t>структуре </a:t>
             </a:r>
             <a:r>
               <a:rPr lang="ru-RU" b="1" dirty="0" smtClean="0"/>
-              <a:t>ышестоящих ответственных</a:t>
-            </a:r>
-            <a:r>
-              <a:rPr lang="ru-RU" dirty="0" smtClean="0"/>
-              <a:t>) в </a:t>
-            </a:r>
-            <a:r>
-              <a:rPr lang="ru-RU" dirty="0" smtClean="0"/>
-              <a:t>нужные группы.</a:t>
-            </a:r>
-          </a:p>
-          <a:p>
-            <a:r>
-              <a:rPr lang="ru-RU" dirty="0" smtClean="0"/>
-              <a:t>Далее пользователи уже включенные в нужные группы с правами администратора могут самостоятельно добавлять пользователей с нужными правами (</a:t>
-            </a:r>
-            <a:r>
-              <a:rPr lang="en-US" dirty="0" smtClean="0"/>
-              <a:t>Admin </a:t>
-            </a:r>
-            <a:r>
-              <a:rPr lang="ru-RU" dirty="0" smtClean="0"/>
-              <a:t>или </a:t>
-            </a:r>
-            <a:r>
-              <a:rPr lang="en-US" dirty="0" smtClean="0"/>
-              <a:t>User)</a:t>
-            </a:r>
-            <a:r>
-              <a:rPr lang="ru-RU" dirty="0" smtClean="0"/>
-              <a:t> и включать их в нужные </a:t>
-            </a:r>
-            <a:r>
-              <a:rPr lang="ru-RU" dirty="0" smtClean="0"/>
-              <a:t>группы.</a:t>
-            </a:r>
-            <a:endParaRPr lang="ru-RU" dirty="0" smtClean="0"/>
-          </a:p>
-          <a:p>
-            <a:r>
-              <a:rPr lang="ru-RU" dirty="0" smtClean="0"/>
-              <a:t>Обычных пользователей (</a:t>
-            </a:r>
-            <a:r>
-              <a:rPr lang="en-US" dirty="0" smtClean="0"/>
-              <a:t>User)</a:t>
-            </a:r>
-            <a:r>
-              <a:rPr lang="ru-RU" dirty="0" smtClean="0"/>
-              <a:t>, так же следует </a:t>
-            </a:r>
-            <a:r>
-              <a:rPr lang="ru-RU" dirty="0" smtClean="0"/>
-              <a:t>добавить в нужную группу, за которой он закрепляется, </a:t>
-            </a:r>
-            <a:r>
-              <a:rPr lang="ru-RU" dirty="0" smtClean="0"/>
-              <a:t>чтобы избиратели </a:t>
-            </a:r>
-            <a:r>
-              <a:rPr lang="ru-RU" dirty="0"/>
-              <a:t>д</a:t>
-            </a:r>
-            <a:r>
-              <a:rPr lang="ru-RU" dirty="0" smtClean="0"/>
-              <a:t>обавляемые ими относились к </a:t>
-            </a:r>
-            <a:r>
-              <a:rPr lang="ru-RU" dirty="0" smtClean="0"/>
-              <a:t>требуемой группе. Т. о. обычный пользователь закрепляется за конкретной группой.</a:t>
-            </a:r>
-            <a:endParaRPr lang="ru-RU" dirty="0"/>
+              <a:t>(руководителей</a:t>
+            </a:r>
+            <a:r>
+              <a:rPr lang="ru-RU" b="1" dirty="0" smtClean="0"/>
+              <a:t>)</a:t>
+            </a:r>
+            <a:r>
+              <a:rPr lang="en-US" b="1" dirty="0" smtClean="0"/>
+              <a:t> </a:t>
+            </a:r>
+            <a:r>
+              <a:rPr lang="ru-RU" b="1" dirty="0" smtClean="0"/>
+              <a:t>и </a:t>
+            </a:r>
+            <a:r>
+              <a:rPr lang="ru-RU" b="1" dirty="0" smtClean="0"/>
+              <a:t>зарегистрированных в </a:t>
+            </a:r>
+            <a:r>
+              <a:rPr lang="ru-RU" b="1" dirty="0" smtClean="0"/>
+              <a:t>сервисе, </a:t>
+            </a:r>
+            <a:r>
+              <a:rPr lang="ru-RU" b="1" dirty="0" smtClean="0"/>
+              <a:t>в данную группу, что бы они могли видеть избирателей, которые будут добавляться в эти группы (вкладка «Группы пользователей).</a:t>
+            </a:r>
+            <a:endParaRPr lang="ru-RU" b="1" dirty="0"/>
           </a:p>
         </p:txBody>
       </p:sp>
@@ -4568,12 +4524,14 @@
         </p:nvSpPr>
         <p:spPr>
           <a:xfrm>
-            <a:off x="4615132" y="767751"/>
-            <a:ext cx="7576867" cy="5409212"/>
-          </a:xfrm>
-        </p:spPr>
-        <p:txBody>
-          <a:bodyPr/>
+            <a:off x="3372928" y="422694"/>
+            <a:ext cx="8678174" cy="6314536"/>
+          </a:xfrm>
+        </p:spPr>
+        <p:txBody>
+          <a:bodyPr>
+            <a:normAutofit fontScale="62500" lnSpcReduction="20000"/>
+          </a:bodyPr>
           <a:lstStyle/>
           <a:p>
             <a:endParaRPr lang="ru-RU" dirty="0"/>
@@ -4582,7 +4540,7 @@
       </p:sp>
       <p:pic>
         <p:nvPicPr>
-          <p:cNvPr id="3074" name="Picture 2"/>
+          <p:cNvPr id="2050" name="Picture 2"/>
           <p:cNvPicPr>
             <a:picLocks noChangeAspect="1" noChangeArrowheads="1"/>
           </p:cNvPicPr>
@@ -4603,8 +4561,8 @@
         </p:blipFill>
         <p:spPr bwMode="auto">
           <a:xfrm>
-            <a:off x="4718648" y="3875947"/>
-            <a:ext cx="6703983" cy="2248359"/>
+            <a:off x="3329795" y="508958"/>
+            <a:ext cx="5149971" cy="3064398"/>
           </a:xfrm>
           <a:prstGeom prst="rect">
             <a:avLst/>
@@ -4646,7 +4604,7 @@
       </p:pic>
       <p:pic>
         <p:nvPicPr>
-          <p:cNvPr id="3075" name="Picture 3"/>
+          <p:cNvPr id="2051" name="Picture 3"/>
           <p:cNvPicPr>
             <a:picLocks noChangeAspect="1" noChangeArrowheads="1"/>
           </p:cNvPicPr>
@@ -4667,8 +4625,8 @@
         </p:blipFill>
         <p:spPr bwMode="auto">
           <a:xfrm>
-            <a:off x="4830793" y="776377"/>
-            <a:ext cx="5633049" cy="2952259"/>
+            <a:off x="8603410" y="508958"/>
+            <a:ext cx="2743543" cy="3153293"/>
           </a:xfrm>
           <a:prstGeom prst="rect">
             <a:avLst/>
@@ -4708,453 +4666,16 @@
           </a:extLst>
         </p:spPr>
       </p:pic>
-    </p:spTree>
-    <p:extLst>
-      <p:ext uri="{BB962C8B-B14F-4D97-AF65-F5344CB8AC3E}">
-        <p14:creationId xmlns:p14="http://schemas.microsoft.com/office/powerpoint/2010/main" val="3895474144"/>
-      </p:ext>
-    </p:extLst>
-  </p:cSld>
-  <p:clrMapOvr>
-    <a:masterClrMapping/>
-  </p:clrMapOvr>
-</p:sld>
-</file>
-
-<file path=ppt/slides/slide6.xml><?xml version="1.0" encoding="utf-8"?>
-<p:sld xmlns:a="http://schemas.openxmlformats.org/drawingml/2006/main" xmlns:r="http://schemas.openxmlformats.org/officeDocument/2006/relationships" xmlns:p="http://schemas.openxmlformats.org/presentationml/2006/main">
-  <p:cSld>
-    <p:spTree>
-      <p:nvGrpSpPr>
-        <p:cNvPr id="1" name=""/>
-        <p:cNvGrpSpPr/>
-        <p:nvPr/>
-      </p:nvGrpSpPr>
-      <p:grpSpPr>
-        <a:xfrm>
-          <a:off x="0" y="0"/>
-          <a:ext cx="0" cy="0"/>
-          <a:chOff x="0" y="0"/>
-          <a:chExt cx="0" cy="0"/>
-        </a:xfrm>
-      </p:grpSpPr>
-      <p:sp>
-        <p:nvSpPr>
-          <p:cNvPr id="2" name="Заголовок 1"/>
-          <p:cNvSpPr>
-            <a:spLocks noGrp="1"/>
-          </p:cNvSpPr>
-          <p:nvPr>
-            <p:ph type="title"/>
-          </p:nvPr>
-        </p:nvSpPr>
-        <p:spPr>
-          <a:xfrm>
-            <a:off x="838200" y="89705"/>
-            <a:ext cx="10515600" cy="483174"/>
-          </a:xfrm>
-        </p:spPr>
-        <p:txBody>
-          <a:bodyPr>
-            <a:normAutofit/>
-          </a:bodyPr>
-          <a:lstStyle/>
-          <a:p>
-            <a:pPr algn="ctr"/>
-            <a:r>
-              <a:rPr lang="ru-RU" sz="2400" b="1" dirty="0"/>
-              <a:t>Порядок действий администраторов</a:t>
-            </a:r>
-            <a:endParaRPr lang="ru-RU" sz="2400" dirty="0"/>
-          </a:p>
-        </p:txBody>
-      </p:sp>
-      <p:sp>
-        <p:nvSpPr>
-          <p:cNvPr id="3" name="Объект 2"/>
-          <p:cNvSpPr>
-            <a:spLocks noGrp="1"/>
-          </p:cNvSpPr>
-          <p:nvPr>
-            <p:ph sz="half" idx="1"/>
-          </p:nvPr>
-        </p:nvSpPr>
-        <p:spPr>
-          <a:xfrm>
-            <a:off x="44986" y="1002536"/>
-            <a:ext cx="5298195" cy="5855464"/>
-          </a:xfrm>
-        </p:spPr>
-        <p:txBody>
-          <a:bodyPr/>
-          <a:lstStyle/>
-          <a:p>
-            <a:r>
-              <a:rPr lang="ru-RU" dirty="0" smtClean="0"/>
-              <a:t>При добавление </a:t>
-            </a:r>
-            <a:r>
-              <a:rPr lang="ru-RU" dirty="0" smtClean="0"/>
-              <a:t>избирателя обычным пользователем (исполнителем) </a:t>
-            </a:r>
-            <a:r>
-              <a:rPr lang="ru-RU" dirty="0" smtClean="0"/>
-              <a:t>по умолчанию будет выбрана </a:t>
-            </a:r>
-            <a:r>
-              <a:rPr lang="ru-RU" dirty="0" smtClean="0"/>
-              <a:t>группа, </a:t>
-            </a:r>
-            <a:r>
-              <a:rPr lang="ru-RU" dirty="0" smtClean="0"/>
-              <a:t>в которой состоит пользователь и избиратель будет отнесен к ней</a:t>
-            </a:r>
-            <a:r>
-              <a:rPr lang="ru-RU" dirty="0" smtClean="0"/>
-              <a:t>.</a:t>
-            </a:r>
-          </a:p>
-          <a:p>
-            <a:pPr marL="0" indent="0">
-              <a:buNone/>
-            </a:pPr>
-            <a:r>
-              <a:rPr lang="ru-RU" dirty="0" smtClean="0"/>
-              <a:t> </a:t>
-            </a:r>
-            <a:r>
-              <a:rPr lang="ru-RU" dirty="0" smtClean="0"/>
-              <a:t>Если пользователь состоит в нескольких группах, то он может выставить любую из них.</a:t>
-            </a:r>
-            <a:endParaRPr lang="ru-RU" dirty="0"/>
-          </a:p>
-        </p:txBody>
-      </p:sp>
       <p:pic>
         <p:nvPicPr>
-          <p:cNvPr id="5" name="Объект 4"/>
-          <p:cNvPicPr>
-            <a:picLocks noGrp="1" noChangeAspect="1"/>
-          </p:cNvPicPr>
-          <p:nvPr>
-            <p:ph sz="half" idx="2"/>
-          </p:nvPr>
-        </p:nvPicPr>
-        <p:blipFill>
-          <a:blip r:embed="rId2"/>
-          <a:stretch>
-            <a:fillRect/>
-          </a:stretch>
-        </p:blipFill>
-        <p:spPr>
-          <a:xfrm>
-            <a:off x="5949108" y="572879"/>
-            <a:ext cx="4186409" cy="6260757"/>
-          </a:xfrm>
-          <a:prstGeom prst="rect">
-            <a:avLst/>
-          </a:prstGeom>
-        </p:spPr>
-      </p:pic>
-    </p:spTree>
-    <p:extLst>
-      <p:ext uri="{BB962C8B-B14F-4D97-AF65-F5344CB8AC3E}">
-        <p14:creationId xmlns:p14="http://schemas.microsoft.com/office/powerpoint/2010/main" val="1259146651"/>
-      </p:ext>
-    </p:extLst>
-  </p:cSld>
-  <p:clrMapOvr>
-    <a:masterClrMapping/>
-  </p:clrMapOvr>
-</p:sld>
-</file>
-
-<file path=ppt/slides/slide7.xml><?xml version="1.0" encoding="utf-8"?>
-<p:sld xmlns:a="http://schemas.openxmlformats.org/drawingml/2006/main" xmlns:r="http://schemas.openxmlformats.org/officeDocument/2006/relationships" xmlns:p="http://schemas.openxmlformats.org/presentationml/2006/main">
-  <p:cSld>
-    <p:spTree>
-      <p:nvGrpSpPr>
-        <p:cNvPr id="1" name=""/>
-        <p:cNvGrpSpPr/>
-        <p:nvPr/>
-      </p:nvGrpSpPr>
-      <p:grpSpPr>
-        <a:xfrm>
-          <a:off x="0" y="0"/>
-          <a:ext cx="0" cy="0"/>
-          <a:chOff x="0" y="0"/>
-          <a:chExt cx="0" cy="0"/>
-        </a:xfrm>
-      </p:grpSpPr>
-      <p:sp>
-        <p:nvSpPr>
-          <p:cNvPr id="2" name="Заголовок 1"/>
-          <p:cNvSpPr>
-            <a:spLocks noGrp="1"/>
-          </p:cNvSpPr>
-          <p:nvPr>
-            <p:ph type="title"/>
-          </p:nvPr>
-        </p:nvSpPr>
-        <p:spPr>
-          <a:xfrm>
-            <a:off x="639897" y="111737"/>
-            <a:ext cx="10515600" cy="472157"/>
-          </a:xfrm>
-        </p:spPr>
-        <p:txBody>
-          <a:bodyPr>
-            <a:normAutofit/>
-          </a:bodyPr>
-          <a:lstStyle/>
-          <a:p>
-            <a:pPr algn="ctr"/>
-            <a:r>
-              <a:rPr lang="ru-RU" sz="2400" b="1" dirty="0" smtClean="0"/>
-              <a:t>Просмотр избирателей</a:t>
-            </a:r>
-            <a:endParaRPr lang="ru-RU" sz="2400" b="1" dirty="0"/>
-          </a:p>
-        </p:txBody>
-      </p:sp>
-      <p:sp>
-        <p:nvSpPr>
-          <p:cNvPr id="3" name="Объект 2"/>
-          <p:cNvSpPr>
-            <a:spLocks noGrp="1"/>
-          </p:cNvSpPr>
-          <p:nvPr>
-            <p:ph sz="half" idx="1"/>
-          </p:nvPr>
-        </p:nvSpPr>
-        <p:spPr>
-          <a:xfrm>
-            <a:off x="407624" y="848299"/>
-            <a:ext cx="3624549" cy="5827923"/>
-          </a:xfrm>
-        </p:spPr>
-        <p:txBody>
-          <a:bodyPr>
-            <a:normAutofit fontScale="92500"/>
-          </a:bodyPr>
-          <a:lstStyle/>
-          <a:p>
-            <a:r>
-              <a:rPr lang="ru-RU" dirty="0" smtClean="0"/>
-              <a:t>Видимость и права на просмотр описаны на слайде </a:t>
-            </a:r>
-            <a:r>
-              <a:rPr lang="ru-RU" dirty="0" smtClean="0">
-                <a:hlinkClick r:id="rId2" action="ppaction://hlinksldjump"/>
-              </a:rPr>
-              <a:t>Уровни</a:t>
-            </a:r>
-            <a:endParaRPr lang="ru-RU" dirty="0" smtClean="0"/>
-          </a:p>
-          <a:p>
-            <a:r>
-              <a:rPr lang="ru-RU" dirty="0" smtClean="0"/>
-              <a:t>На каждой колонки есть сортировка по убыванию или возрастанию</a:t>
-            </a:r>
-          </a:p>
-          <a:p>
-            <a:r>
-              <a:rPr lang="ru-RU" dirty="0" smtClean="0"/>
-              <a:t>Для отбора нужных записей реализованы фильтры</a:t>
-            </a:r>
-          </a:p>
-          <a:p>
-            <a:r>
-              <a:rPr lang="ru-RU" dirty="0" smtClean="0"/>
-              <a:t>Поиск – фильтрует записи таблицы, осуществляя поиск по всем столбцам.</a:t>
-            </a:r>
-          </a:p>
-        </p:txBody>
-      </p:sp>
-      <p:pic>
-        <p:nvPicPr>
-          <p:cNvPr id="8" name="Объект 7"/>
-          <p:cNvPicPr>
-            <a:picLocks noGrp="1" noChangeAspect="1"/>
-          </p:cNvPicPr>
-          <p:nvPr>
-            <p:ph sz="half" idx="2"/>
-          </p:nvPr>
-        </p:nvPicPr>
-        <p:blipFill>
-          <a:blip r:embed="rId3"/>
-          <a:stretch>
-            <a:fillRect/>
-          </a:stretch>
-        </p:blipFill>
-        <p:spPr>
-          <a:xfrm>
-            <a:off x="4299332" y="848298"/>
-            <a:ext cx="7659839" cy="3007605"/>
-          </a:xfrm>
-          <a:prstGeom prst="rect">
-            <a:avLst/>
-          </a:prstGeom>
-        </p:spPr>
-      </p:pic>
-      <p:pic>
-        <p:nvPicPr>
-          <p:cNvPr id="10" name="Рисунок 9"/>
-          <p:cNvPicPr>
-            <a:picLocks noChangeAspect="1"/>
-          </p:cNvPicPr>
-          <p:nvPr/>
-        </p:nvPicPr>
-        <p:blipFill>
-          <a:blip r:embed="rId4"/>
-          <a:stretch>
-            <a:fillRect/>
-          </a:stretch>
-        </p:blipFill>
-        <p:spPr>
-          <a:xfrm>
-            <a:off x="4662310" y="3855903"/>
-            <a:ext cx="7405511" cy="3031866"/>
-          </a:xfrm>
-          <a:prstGeom prst="rect">
-            <a:avLst/>
-          </a:prstGeom>
-        </p:spPr>
-      </p:pic>
-    </p:spTree>
-    <p:extLst>
-      <p:ext uri="{BB962C8B-B14F-4D97-AF65-F5344CB8AC3E}">
-        <p14:creationId xmlns:p14="http://schemas.microsoft.com/office/powerpoint/2010/main" val="1109741373"/>
-      </p:ext>
-    </p:extLst>
-  </p:cSld>
-  <p:clrMapOvr>
-    <a:masterClrMapping/>
-  </p:clrMapOvr>
-</p:sld>
-</file>
-
-<file path=ppt/slides/slide8.xml><?xml version="1.0" encoding="utf-8"?>
-<p:sld xmlns:a="http://schemas.openxmlformats.org/drawingml/2006/main" xmlns:r="http://schemas.openxmlformats.org/officeDocument/2006/relationships" xmlns:p="http://schemas.openxmlformats.org/presentationml/2006/main">
-  <p:cSld>
-    <p:spTree>
-      <p:nvGrpSpPr>
-        <p:cNvPr id="1" name=""/>
-        <p:cNvGrpSpPr/>
-        <p:nvPr/>
-      </p:nvGrpSpPr>
-      <p:grpSpPr>
-        <a:xfrm>
-          <a:off x="0" y="0"/>
-          <a:ext cx="0" cy="0"/>
-          <a:chOff x="0" y="0"/>
-          <a:chExt cx="0" cy="0"/>
-        </a:xfrm>
-      </p:grpSpPr>
-      <p:sp>
-        <p:nvSpPr>
-          <p:cNvPr id="2" name="Заголовок 1"/>
-          <p:cNvSpPr>
-            <a:spLocks noGrp="1"/>
-          </p:cNvSpPr>
-          <p:nvPr>
-            <p:ph type="title"/>
-          </p:nvPr>
-        </p:nvSpPr>
-        <p:spPr>
-          <a:xfrm>
-            <a:off x="838200" y="2"/>
-            <a:ext cx="10515600" cy="638354"/>
-          </a:xfrm>
-        </p:spPr>
-        <p:txBody>
-          <a:bodyPr>
-            <a:normAutofit/>
-          </a:bodyPr>
-          <a:lstStyle/>
-          <a:p>
-            <a:pPr algn="ctr"/>
-            <a:r>
-              <a:rPr lang="ru-RU" sz="2400" b="1" dirty="0"/>
-              <a:t>Просмотр избирателей</a:t>
-            </a:r>
-            <a:endParaRPr lang="ru-RU" sz="2400" dirty="0"/>
-          </a:p>
-        </p:txBody>
-      </p:sp>
-      <p:sp>
-        <p:nvSpPr>
-          <p:cNvPr id="3" name="Объект 2"/>
-          <p:cNvSpPr>
-            <a:spLocks noGrp="1"/>
-          </p:cNvSpPr>
-          <p:nvPr>
-            <p:ph sz="half" idx="1"/>
-          </p:nvPr>
-        </p:nvSpPr>
-        <p:spPr>
-          <a:xfrm>
-            <a:off x="61821" y="1480568"/>
-            <a:ext cx="3613031" cy="2522089"/>
-          </a:xfrm>
-        </p:spPr>
-        <p:txBody>
-          <a:bodyPr>
-            <a:normAutofit lnSpcReduction="10000"/>
-          </a:bodyPr>
-          <a:lstStyle/>
-          <a:p>
-            <a:r>
-              <a:rPr lang="ru-RU" sz="2000" dirty="0"/>
-              <a:t>В таблицу вынесена только основная информация, для просмотра всех данных по избирателю необходимо выбрать «Подробнее» в последней </a:t>
-            </a:r>
-            <a:r>
-              <a:rPr lang="ru-RU" sz="2000" dirty="0" smtClean="0"/>
-              <a:t>колонке. Из открывшейся формы можно сразу перейти на форму правки избирателя.</a:t>
-            </a:r>
-            <a:endParaRPr lang="ru-RU" sz="2000" dirty="0"/>
-          </a:p>
-          <a:p>
-            <a:endParaRPr lang="ru-RU" dirty="0"/>
-          </a:p>
-        </p:txBody>
-      </p:sp>
-      <p:sp>
-        <p:nvSpPr>
-          <p:cNvPr id="4" name="Объект 3"/>
-          <p:cNvSpPr>
-            <a:spLocks noGrp="1"/>
-          </p:cNvSpPr>
-          <p:nvPr>
-            <p:ph sz="half" idx="2"/>
-          </p:nvPr>
-        </p:nvSpPr>
-        <p:spPr>
-          <a:xfrm>
-            <a:off x="3519577" y="948906"/>
-            <a:ext cx="8583283" cy="5814203"/>
-          </a:xfrm>
-        </p:spPr>
-        <p:txBody>
-          <a:bodyPr>
-            <a:normAutofit lnSpcReduction="10000"/>
-          </a:bodyPr>
-          <a:lstStyle/>
-          <a:p>
-            <a:endParaRPr lang="ru-RU" dirty="0"/>
-          </a:p>
-        </p:txBody>
-      </p:sp>
-      <p:pic>
-        <p:nvPicPr>
-          <p:cNvPr id="1026" name="Picture 2"/>
+          <p:cNvPr id="2052" name="Picture 4"/>
           <p:cNvPicPr>
             <a:picLocks noChangeAspect="1" noChangeArrowheads="1"/>
           </p:cNvPicPr>
           <p:nvPr/>
         </p:nvPicPr>
         <p:blipFill>
-          <a:blip r:embed="rId2">
+          <a:blip r:embed="rId4">
             <a:extLst>
               <a:ext uri="{28A0092B-C50C-407E-A947-70E740481C1C}">
                 <a14:useLocalDpi xmlns:a14="http://schemas.microsoft.com/office/drawing/2010/main" val="0"/>
@@ -5168,8 +4689,8 @@
         </p:blipFill>
         <p:spPr bwMode="auto">
           <a:xfrm>
-            <a:off x="3631719" y="1024907"/>
-            <a:ext cx="8441385" cy="4099184"/>
+            <a:off x="4002657" y="3760233"/>
+            <a:ext cx="7557998" cy="2534775"/>
           </a:xfrm>
           <a:prstGeom prst="rect">
             <a:avLst/>
@@ -5212,6 +4733,815 @@
     </p:spTree>
     <p:extLst>
       <p:ext uri="{BB962C8B-B14F-4D97-AF65-F5344CB8AC3E}">
+        <p14:creationId xmlns:p14="http://schemas.microsoft.com/office/powerpoint/2010/main" val="1378234309"/>
+      </p:ext>
+    </p:extLst>
+  </p:cSld>
+  <p:clrMapOvr>
+    <a:masterClrMapping/>
+  </p:clrMapOvr>
+</p:sld>
+</file>
+
+<file path=ppt/slides/slide5.xml><?xml version="1.0" encoding="utf-8"?>
+<p:sld xmlns:a="http://schemas.openxmlformats.org/drawingml/2006/main" xmlns:r="http://schemas.openxmlformats.org/officeDocument/2006/relationships" xmlns:p="http://schemas.openxmlformats.org/presentationml/2006/main">
+  <p:cSld>
+    <p:spTree>
+      <p:nvGrpSpPr>
+        <p:cNvPr id="1" name=""/>
+        <p:cNvGrpSpPr/>
+        <p:nvPr/>
+      </p:nvGrpSpPr>
+      <p:grpSpPr>
+        <a:xfrm>
+          <a:off x="0" y="0"/>
+          <a:ext cx="0" cy="0"/>
+          <a:chOff x="0" y="0"/>
+          <a:chExt cx="0" cy="0"/>
+        </a:xfrm>
+      </p:grpSpPr>
+      <p:sp>
+        <p:nvSpPr>
+          <p:cNvPr id="2" name="Заголовок 1"/>
+          <p:cNvSpPr>
+            <a:spLocks noGrp="1"/>
+          </p:cNvSpPr>
+          <p:nvPr>
+            <p:ph type="title"/>
+          </p:nvPr>
+        </p:nvSpPr>
+        <p:spPr>
+          <a:xfrm>
+            <a:off x="606846" y="1"/>
+            <a:ext cx="10515600" cy="517584"/>
+          </a:xfrm>
+        </p:spPr>
+        <p:txBody>
+          <a:bodyPr>
+            <a:normAutofit/>
+          </a:bodyPr>
+          <a:lstStyle/>
+          <a:p>
+            <a:pPr algn="ctr"/>
+            <a:r>
+              <a:rPr lang="ru-RU" sz="2400" b="1" dirty="0"/>
+              <a:t>Порядок действий администраторов</a:t>
+            </a:r>
+            <a:endParaRPr lang="ru-RU" sz="2400" dirty="0"/>
+          </a:p>
+        </p:txBody>
+      </p:sp>
+      <p:sp>
+        <p:nvSpPr>
+          <p:cNvPr id="3" name="Объект 2"/>
+          <p:cNvSpPr>
+            <a:spLocks noGrp="1"/>
+          </p:cNvSpPr>
+          <p:nvPr>
+            <p:ph sz="half" idx="1"/>
+          </p:nvPr>
+        </p:nvSpPr>
+        <p:spPr>
+          <a:xfrm>
+            <a:off x="44986" y="616944"/>
+            <a:ext cx="4813453" cy="6147413"/>
+          </a:xfrm>
+        </p:spPr>
+        <p:txBody>
+          <a:bodyPr>
+            <a:normAutofit fontScale="85000" lnSpcReduction="20000"/>
+          </a:bodyPr>
+          <a:lstStyle/>
+          <a:p>
+            <a:r>
+              <a:rPr lang="ru-RU" dirty="0" smtClean="0"/>
+              <a:t>Пользователь </a:t>
+            </a:r>
+            <a:r>
+              <a:rPr lang="ru-RU" dirty="0"/>
+              <a:t>с правами </a:t>
+            </a:r>
+            <a:r>
+              <a:rPr lang="ru-RU" dirty="0" smtClean="0"/>
+              <a:t>администратора, создавший требуемую группу/группы, добавляет всех нужных пользователей (</a:t>
+            </a:r>
+            <a:r>
+              <a:rPr lang="ru-RU" b="1" dirty="0" smtClean="0"/>
+              <a:t>в </a:t>
+            </a:r>
+            <a:r>
+              <a:rPr lang="ru-RU" b="1" dirty="0" err="1" smtClean="0"/>
+              <a:t>т.ч</a:t>
+            </a:r>
+            <a:r>
+              <a:rPr lang="ru-RU" b="1" dirty="0" smtClean="0"/>
+              <a:t>. </a:t>
+            </a:r>
+            <a:r>
+              <a:rPr lang="ru-RU" b="1" dirty="0"/>
+              <a:t>в</a:t>
+            </a:r>
+            <a:r>
+              <a:rPr lang="ru-RU" b="1" dirty="0" smtClean="0"/>
+              <a:t>ышестоящих ответственных</a:t>
+            </a:r>
+            <a:r>
+              <a:rPr lang="ru-RU" dirty="0" smtClean="0"/>
+              <a:t>) в </a:t>
+            </a:r>
+            <a:r>
+              <a:rPr lang="ru-RU" dirty="0" smtClean="0"/>
+              <a:t>созданные группы.</a:t>
+            </a:r>
+            <a:endParaRPr lang="ru-RU" dirty="0" smtClean="0"/>
+          </a:p>
+          <a:p>
+            <a:r>
+              <a:rPr lang="ru-RU" dirty="0" smtClean="0"/>
+              <a:t>Далее пользователи уже включенные в нужные группы с правами администратора могут самостоятельно добавлять пользователей с нужными правами (</a:t>
+            </a:r>
+            <a:r>
+              <a:rPr lang="en-US" dirty="0" smtClean="0"/>
+              <a:t>Admin </a:t>
+            </a:r>
+            <a:r>
+              <a:rPr lang="ru-RU" dirty="0" smtClean="0"/>
+              <a:t>или </a:t>
+            </a:r>
+            <a:r>
+              <a:rPr lang="en-US" dirty="0" smtClean="0"/>
+              <a:t>User)</a:t>
+            </a:r>
+            <a:r>
+              <a:rPr lang="ru-RU" dirty="0" smtClean="0"/>
+              <a:t> и включать их в </a:t>
+            </a:r>
+            <a:r>
+              <a:rPr lang="ru-RU" dirty="0" smtClean="0"/>
+              <a:t>свои </a:t>
+            </a:r>
+            <a:r>
+              <a:rPr lang="ru-RU" dirty="0" smtClean="0"/>
+              <a:t>группы.</a:t>
+            </a:r>
+          </a:p>
+          <a:p>
+            <a:r>
+              <a:rPr lang="ru-RU" dirty="0" smtClean="0"/>
+              <a:t>Обычных пользователей (</a:t>
+            </a:r>
+            <a:r>
+              <a:rPr lang="en-US" dirty="0" smtClean="0"/>
+              <a:t>User)</a:t>
+            </a:r>
+            <a:r>
+              <a:rPr lang="ru-RU" dirty="0" smtClean="0"/>
+              <a:t>, так же следует добавить в нужную группу, за которой он закрепляется, чтобы избиратели </a:t>
+            </a:r>
+            <a:r>
+              <a:rPr lang="ru-RU" dirty="0"/>
+              <a:t>д</a:t>
+            </a:r>
+            <a:r>
+              <a:rPr lang="ru-RU" dirty="0" smtClean="0"/>
+              <a:t>обавляемые ими относились к требуемой группе. Т. о. обычный пользователь закрепляется за конкретной группой.</a:t>
+            </a:r>
+            <a:endParaRPr lang="ru-RU" dirty="0"/>
+          </a:p>
+        </p:txBody>
+      </p:sp>
+      <p:sp>
+        <p:nvSpPr>
+          <p:cNvPr id="4" name="Объект 3"/>
+          <p:cNvSpPr>
+            <a:spLocks noGrp="1"/>
+          </p:cNvSpPr>
+          <p:nvPr>
+            <p:ph sz="half" idx="2"/>
+          </p:nvPr>
+        </p:nvSpPr>
+        <p:spPr>
+          <a:xfrm>
+            <a:off x="4615132" y="767751"/>
+            <a:ext cx="7576867" cy="5409212"/>
+          </a:xfrm>
+        </p:spPr>
+        <p:txBody>
+          <a:bodyPr/>
+          <a:lstStyle/>
+          <a:p>
+            <a:endParaRPr lang="ru-RU" dirty="0"/>
+          </a:p>
+        </p:txBody>
+      </p:sp>
+      <p:pic>
+        <p:nvPicPr>
+          <p:cNvPr id="3074" name="Picture 2"/>
+          <p:cNvPicPr>
+            <a:picLocks noChangeAspect="1" noChangeArrowheads="1"/>
+          </p:cNvPicPr>
+          <p:nvPr/>
+        </p:nvPicPr>
+        <p:blipFill>
+          <a:blip r:embed="rId2">
+            <a:extLst>
+              <a:ext uri="{28A0092B-C50C-407E-A947-70E740481C1C}">
+                <a14:useLocalDpi xmlns:a14="http://schemas.microsoft.com/office/drawing/2010/main" val="0"/>
+              </a:ext>
+            </a:extLst>
+          </a:blip>
+          <a:srcRect/>
+          <a:stretch>
+            <a:fillRect/>
+          </a:stretch>
+        </p:blipFill>
+        <p:spPr bwMode="auto">
+          <a:xfrm>
+            <a:off x="4718648" y="3875947"/>
+            <a:ext cx="6703983" cy="2248359"/>
+          </a:xfrm>
+          <a:prstGeom prst="rect">
+            <a:avLst/>
+          </a:prstGeom>
+          <a:noFill/>
+          <a:ln>
+            <a:noFill/>
+          </a:ln>
+          <a:effectLst/>
+          <a:extLst>
+            <a:ext uri="{909E8E84-426E-40DD-AFC4-6F175D3DCCD1}">
+              <a14:hiddenFill xmlns:a14="http://schemas.microsoft.com/office/drawing/2010/main">
+                <a:solidFill>
+                  <a:schemeClr val="accent1"/>
+                </a:solidFill>
+              </a14:hiddenFill>
+            </a:ext>
+            <a:ext uri="{91240B29-F687-4F45-9708-019B960494DF}">
+              <a14:hiddenLine xmlns:a14="http://schemas.microsoft.com/office/drawing/2010/main" w="9525">
+                <a:solidFill>
+                  <a:schemeClr val="tx1"/>
+                </a:solidFill>
+                <a:miter lim="800000"/>
+                <a:headEnd/>
+                <a:tailEnd/>
+              </a14:hiddenLine>
+            </a:ext>
+            <a:ext uri="{AF507438-7753-43E0-B8FC-AC1667EBCBE1}">
+              <a14:hiddenEffects xmlns:a14="http://schemas.microsoft.com/office/drawing/2010/main">
+                <a:effectLst>
+                  <a:outerShdw dist="35921" dir="2700000" algn="ctr" rotWithShape="0">
+                    <a:schemeClr val="bg2"/>
+                  </a:outerShdw>
+                </a:effectLst>
+              </a14:hiddenEffects>
+            </a:ext>
+          </a:extLst>
+        </p:spPr>
+      </p:pic>
+      <p:pic>
+        <p:nvPicPr>
+          <p:cNvPr id="3075" name="Picture 3"/>
+          <p:cNvPicPr>
+            <a:picLocks noChangeAspect="1" noChangeArrowheads="1"/>
+          </p:cNvPicPr>
+          <p:nvPr/>
+        </p:nvPicPr>
+        <p:blipFill>
+          <a:blip r:embed="rId3">
+            <a:extLst>
+              <a:ext uri="{28A0092B-C50C-407E-A947-70E740481C1C}">
+                <a14:useLocalDpi xmlns:a14="http://schemas.microsoft.com/office/drawing/2010/main" val="0"/>
+              </a:ext>
+            </a:extLst>
+          </a:blip>
+          <a:srcRect/>
+          <a:stretch>
+            <a:fillRect/>
+          </a:stretch>
+        </p:blipFill>
+        <p:spPr bwMode="auto">
+          <a:xfrm>
+            <a:off x="4830793" y="776377"/>
+            <a:ext cx="5633049" cy="2952259"/>
+          </a:xfrm>
+          <a:prstGeom prst="rect">
+            <a:avLst/>
+          </a:prstGeom>
+          <a:noFill/>
+          <a:ln>
+            <a:noFill/>
+          </a:ln>
+          <a:effectLst/>
+          <a:extLst>
+            <a:ext uri="{909E8E84-426E-40DD-AFC4-6F175D3DCCD1}">
+              <a14:hiddenFill xmlns:a14="http://schemas.microsoft.com/office/drawing/2010/main">
+                <a:solidFill>
+                  <a:schemeClr val="accent1"/>
+                </a:solidFill>
+              </a14:hiddenFill>
+            </a:ext>
+            <a:ext uri="{91240B29-F687-4F45-9708-019B960494DF}">
+              <a14:hiddenLine xmlns:a14="http://schemas.microsoft.com/office/drawing/2010/main" w="9525">
+                <a:solidFill>
+                  <a:schemeClr val="tx1"/>
+                </a:solidFill>
+                <a:miter lim="800000"/>
+                <a:headEnd/>
+                <a:tailEnd/>
+              </a14:hiddenLine>
+            </a:ext>
+            <a:ext uri="{AF507438-7753-43E0-B8FC-AC1667EBCBE1}">
+              <a14:hiddenEffects xmlns:a14="http://schemas.microsoft.com/office/drawing/2010/main">
+                <a:effectLst>
+                  <a:outerShdw dist="35921" dir="2700000" algn="ctr" rotWithShape="0">
+                    <a:schemeClr val="bg2"/>
+                  </a:outerShdw>
+                </a:effectLst>
+              </a14:hiddenEffects>
+            </a:ext>
+          </a:extLst>
+        </p:spPr>
+      </p:pic>
+    </p:spTree>
+    <p:extLst>
+      <p:ext uri="{BB962C8B-B14F-4D97-AF65-F5344CB8AC3E}">
+        <p14:creationId xmlns:p14="http://schemas.microsoft.com/office/powerpoint/2010/main" val="3895474144"/>
+      </p:ext>
+    </p:extLst>
+  </p:cSld>
+  <p:clrMapOvr>
+    <a:masterClrMapping/>
+  </p:clrMapOvr>
+</p:sld>
+</file>
+
+<file path=ppt/slides/slide6.xml><?xml version="1.0" encoding="utf-8"?>
+<p:sld xmlns:a="http://schemas.openxmlformats.org/drawingml/2006/main" xmlns:r="http://schemas.openxmlformats.org/officeDocument/2006/relationships" xmlns:p="http://schemas.openxmlformats.org/presentationml/2006/main">
+  <p:cSld>
+    <p:spTree>
+      <p:nvGrpSpPr>
+        <p:cNvPr id="1" name=""/>
+        <p:cNvGrpSpPr/>
+        <p:nvPr/>
+      </p:nvGrpSpPr>
+      <p:grpSpPr>
+        <a:xfrm>
+          <a:off x="0" y="0"/>
+          <a:ext cx="0" cy="0"/>
+          <a:chOff x="0" y="0"/>
+          <a:chExt cx="0" cy="0"/>
+        </a:xfrm>
+      </p:grpSpPr>
+      <p:sp>
+        <p:nvSpPr>
+          <p:cNvPr id="2" name="Заголовок 1"/>
+          <p:cNvSpPr>
+            <a:spLocks noGrp="1"/>
+          </p:cNvSpPr>
+          <p:nvPr>
+            <p:ph type="title"/>
+          </p:nvPr>
+        </p:nvSpPr>
+        <p:spPr>
+          <a:xfrm>
+            <a:off x="838200" y="89705"/>
+            <a:ext cx="10515600" cy="483174"/>
+          </a:xfrm>
+        </p:spPr>
+        <p:txBody>
+          <a:bodyPr>
+            <a:normAutofit/>
+          </a:bodyPr>
+          <a:lstStyle/>
+          <a:p>
+            <a:pPr algn="ctr"/>
+            <a:r>
+              <a:rPr lang="ru-RU" sz="2400" b="1" dirty="0"/>
+              <a:t>Порядок действий администраторов</a:t>
+            </a:r>
+            <a:endParaRPr lang="ru-RU" sz="2400" dirty="0"/>
+          </a:p>
+        </p:txBody>
+      </p:sp>
+      <p:sp>
+        <p:nvSpPr>
+          <p:cNvPr id="3" name="Объект 2"/>
+          <p:cNvSpPr>
+            <a:spLocks noGrp="1"/>
+          </p:cNvSpPr>
+          <p:nvPr>
+            <p:ph sz="half" idx="1"/>
+          </p:nvPr>
+        </p:nvSpPr>
+        <p:spPr>
+          <a:xfrm>
+            <a:off x="44986" y="1002536"/>
+            <a:ext cx="5298195" cy="5855464"/>
+          </a:xfrm>
+        </p:spPr>
+        <p:txBody>
+          <a:bodyPr/>
+          <a:lstStyle/>
+          <a:p>
+            <a:r>
+              <a:rPr lang="ru-RU" dirty="0" smtClean="0"/>
+              <a:t>При добавление избирателя обычным пользователем (исполнителем) по умолчанию будет выбрана группа, в которой состоит пользователь и избиратель будет отнесен к ней.</a:t>
+            </a:r>
+          </a:p>
+          <a:p>
+            <a:pPr marL="0" indent="0">
+              <a:buNone/>
+            </a:pPr>
+            <a:r>
+              <a:rPr lang="ru-RU" dirty="0" smtClean="0"/>
+              <a:t> Если пользователь состоит в нескольких группах, то он может выставить любую из них.</a:t>
+            </a:r>
+            <a:endParaRPr lang="ru-RU" dirty="0"/>
+          </a:p>
+        </p:txBody>
+      </p:sp>
+      <p:pic>
+        <p:nvPicPr>
+          <p:cNvPr id="5" name="Объект 4"/>
+          <p:cNvPicPr>
+            <a:picLocks noGrp="1" noChangeAspect="1"/>
+          </p:cNvPicPr>
+          <p:nvPr>
+            <p:ph sz="half" idx="2"/>
+          </p:nvPr>
+        </p:nvPicPr>
+        <p:blipFill>
+          <a:blip r:embed="rId2"/>
+          <a:stretch>
+            <a:fillRect/>
+          </a:stretch>
+        </p:blipFill>
+        <p:spPr>
+          <a:xfrm>
+            <a:off x="5949108" y="572879"/>
+            <a:ext cx="4186409" cy="6260757"/>
+          </a:xfrm>
+          <a:prstGeom prst="rect">
+            <a:avLst/>
+          </a:prstGeom>
+        </p:spPr>
+      </p:pic>
+    </p:spTree>
+    <p:extLst>
+      <p:ext uri="{BB962C8B-B14F-4D97-AF65-F5344CB8AC3E}">
+        <p14:creationId xmlns:p14="http://schemas.microsoft.com/office/powerpoint/2010/main" val="1259146651"/>
+      </p:ext>
+    </p:extLst>
+  </p:cSld>
+  <p:clrMapOvr>
+    <a:masterClrMapping/>
+  </p:clrMapOvr>
+</p:sld>
+</file>
+
+<file path=ppt/slides/slide7.xml><?xml version="1.0" encoding="utf-8"?>
+<p:sld xmlns:a="http://schemas.openxmlformats.org/drawingml/2006/main" xmlns:r="http://schemas.openxmlformats.org/officeDocument/2006/relationships" xmlns:p="http://schemas.openxmlformats.org/presentationml/2006/main">
+  <p:cSld>
+    <p:spTree>
+      <p:nvGrpSpPr>
+        <p:cNvPr id="1" name=""/>
+        <p:cNvGrpSpPr/>
+        <p:nvPr/>
+      </p:nvGrpSpPr>
+      <p:grpSpPr>
+        <a:xfrm>
+          <a:off x="0" y="0"/>
+          <a:ext cx="0" cy="0"/>
+          <a:chOff x="0" y="0"/>
+          <a:chExt cx="0" cy="0"/>
+        </a:xfrm>
+      </p:grpSpPr>
+      <p:sp>
+        <p:nvSpPr>
+          <p:cNvPr id="2" name="Заголовок 1"/>
+          <p:cNvSpPr>
+            <a:spLocks noGrp="1"/>
+          </p:cNvSpPr>
+          <p:nvPr>
+            <p:ph type="title"/>
+          </p:nvPr>
+        </p:nvSpPr>
+        <p:spPr>
+          <a:xfrm>
+            <a:off x="639897" y="111737"/>
+            <a:ext cx="10515600" cy="472157"/>
+          </a:xfrm>
+        </p:spPr>
+        <p:txBody>
+          <a:bodyPr>
+            <a:normAutofit/>
+          </a:bodyPr>
+          <a:lstStyle/>
+          <a:p>
+            <a:pPr algn="ctr"/>
+            <a:r>
+              <a:rPr lang="ru-RU" sz="2400" b="1" dirty="0" smtClean="0"/>
+              <a:t>Просмотр избирателей</a:t>
+            </a:r>
+            <a:endParaRPr lang="ru-RU" sz="2400" b="1" dirty="0"/>
+          </a:p>
+        </p:txBody>
+      </p:sp>
+      <p:sp>
+        <p:nvSpPr>
+          <p:cNvPr id="3" name="Объект 2"/>
+          <p:cNvSpPr>
+            <a:spLocks noGrp="1"/>
+          </p:cNvSpPr>
+          <p:nvPr>
+            <p:ph sz="half" idx="1"/>
+          </p:nvPr>
+        </p:nvSpPr>
+        <p:spPr>
+          <a:xfrm>
+            <a:off x="407624" y="848299"/>
+            <a:ext cx="3624549" cy="5827923"/>
+          </a:xfrm>
+        </p:spPr>
+        <p:txBody>
+          <a:bodyPr>
+            <a:normAutofit fontScale="92500"/>
+          </a:bodyPr>
+          <a:lstStyle/>
+          <a:p>
+            <a:r>
+              <a:rPr lang="ru-RU" dirty="0" smtClean="0"/>
+              <a:t>Видимость и права на просмотр описаны на слайде </a:t>
+            </a:r>
+            <a:r>
+              <a:rPr lang="ru-RU" dirty="0" smtClean="0">
+                <a:hlinkClick r:id="rId2" action="ppaction://hlinksldjump"/>
+              </a:rPr>
+              <a:t>Уровни</a:t>
+            </a:r>
+            <a:endParaRPr lang="ru-RU" dirty="0" smtClean="0"/>
+          </a:p>
+          <a:p>
+            <a:r>
+              <a:rPr lang="ru-RU" dirty="0" smtClean="0"/>
+              <a:t>На каждой колонки есть сортировка по убыванию или возрастанию</a:t>
+            </a:r>
+          </a:p>
+          <a:p>
+            <a:r>
+              <a:rPr lang="ru-RU" dirty="0" smtClean="0"/>
+              <a:t>Для отбора нужных записей реализованы фильтры</a:t>
+            </a:r>
+          </a:p>
+          <a:p>
+            <a:r>
+              <a:rPr lang="ru-RU" dirty="0" smtClean="0"/>
+              <a:t>Поиск – фильтрует записи таблицы, осуществляя поиск по всем столбцам.</a:t>
+            </a:r>
+          </a:p>
+        </p:txBody>
+      </p:sp>
+      <p:pic>
+        <p:nvPicPr>
+          <p:cNvPr id="8" name="Объект 7"/>
+          <p:cNvPicPr>
+            <a:picLocks noGrp="1" noChangeAspect="1"/>
+          </p:cNvPicPr>
+          <p:nvPr>
+            <p:ph sz="half" idx="2"/>
+          </p:nvPr>
+        </p:nvPicPr>
+        <p:blipFill>
+          <a:blip r:embed="rId3"/>
+          <a:stretch>
+            <a:fillRect/>
+          </a:stretch>
+        </p:blipFill>
+        <p:spPr>
+          <a:xfrm>
+            <a:off x="4299332" y="848298"/>
+            <a:ext cx="7659839" cy="3007605"/>
+          </a:xfrm>
+          <a:prstGeom prst="rect">
+            <a:avLst/>
+          </a:prstGeom>
+        </p:spPr>
+      </p:pic>
+      <p:pic>
+        <p:nvPicPr>
+          <p:cNvPr id="10" name="Рисунок 9"/>
+          <p:cNvPicPr>
+            <a:picLocks noChangeAspect="1"/>
+          </p:cNvPicPr>
+          <p:nvPr/>
+        </p:nvPicPr>
+        <p:blipFill>
+          <a:blip r:embed="rId4"/>
+          <a:stretch>
+            <a:fillRect/>
+          </a:stretch>
+        </p:blipFill>
+        <p:spPr>
+          <a:xfrm>
+            <a:off x="4662310" y="3855903"/>
+            <a:ext cx="7405511" cy="3031866"/>
+          </a:xfrm>
+          <a:prstGeom prst="rect">
+            <a:avLst/>
+          </a:prstGeom>
+        </p:spPr>
+      </p:pic>
+    </p:spTree>
+    <p:extLst>
+      <p:ext uri="{BB962C8B-B14F-4D97-AF65-F5344CB8AC3E}">
+        <p14:creationId xmlns:p14="http://schemas.microsoft.com/office/powerpoint/2010/main" val="1109741373"/>
+      </p:ext>
+    </p:extLst>
+  </p:cSld>
+  <p:clrMapOvr>
+    <a:masterClrMapping/>
+  </p:clrMapOvr>
+</p:sld>
+</file>
+
+<file path=ppt/slides/slide8.xml><?xml version="1.0" encoding="utf-8"?>
+<p:sld xmlns:a="http://schemas.openxmlformats.org/drawingml/2006/main" xmlns:r="http://schemas.openxmlformats.org/officeDocument/2006/relationships" xmlns:p="http://schemas.openxmlformats.org/presentationml/2006/main">
+  <p:cSld>
+    <p:spTree>
+      <p:nvGrpSpPr>
+        <p:cNvPr id="1" name=""/>
+        <p:cNvGrpSpPr/>
+        <p:nvPr/>
+      </p:nvGrpSpPr>
+      <p:grpSpPr>
+        <a:xfrm>
+          <a:off x="0" y="0"/>
+          <a:ext cx="0" cy="0"/>
+          <a:chOff x="0" y="0"/>
+          <a:chExt cx="0" cy="0"/>
+        </a:xfrm>
+      </p:grpSpPr>
+      <p:sp>
+        <p:nvSpPr>
+          <p:cNvPr id="2" name="Заголовок 1"/>
+          <p:cNvSpPr>
+            <a:spLocks noGrp="1"/>
+          </p:cNvSpPr>
+          <p:nvPr>
+            <p:ph type="title"/>
+          </p:nvPr>
+        </p:nvSpPr>
+        <p:spPr>
+          <a:xfrm>
+            <a:off x="838200" y="2"/>
+            <a:ext cx="10515600" cy="638354"/>
+          </a:xfrm>
+        </p:spPr>
+        <p:txBody>
+          <a:bodyPr>
+            <a:normAutofit/>
+          </a:bodyPr>
+          <a:lstStyle/>
+          <a:p>
+            <a:pPr algn="ctr"/>
+            <a:r>
+              <a:rPr lang="ru-RU" sz="2400" b="1" dirty="0"/>
+              <a:t>Просмотр избирателей</a:t>
+            </a:r>
+            <a:endParaRPr lang="ru-RU" sz="2400" dirty="0"/>
+          </a:p>
+        </p:txBody>
+      </p:sp>
+      <p:sp>
+        <p:nvSpPr>
+          <p:cNvPr id="3" name="Объект 2"/>
+          <p:cNvSpPr>
+            <a:spLocks noGrp="1"/>
+          </p:cNvSpPr>
+          <p:nvPr>
+            <p:ph sz="half" idx="1"/>
+          </p:nvPr>
+        </p:nvSpPr>
+        <p:spPr>
+          <a:xfrm>
+            <a:off x="61821" y="1480568"/>
+            <a:ext cx="3613031" cy="2522089"/>
+          </a:xfrm>
+        </p:spPr>
+        <p:txBody>
+          <a:bodyPr>
+            <a:normAutofit lnSpcReduction="10000"/>
+          </a:bodyPr>
+          <a:lstStyle/>
+          <a:p>
+            <a:r>
+              <a:rPr lang="ru-RU" sz="2000" dirty="0"/>
+              <a:t>В таблицу вынесена только основная информация, для просмотра всех данных по избирателю необходимо выбрать «Подробнее» в последней </a:t>
+            </a:r>
+            <a:r>
+              <a:rPr lang="ru-RU" sz="2000" dirty="0" smtClean="0"/>
+              <a:t>колонке. Из открывшейся формы можно сразу перейти на форму правки избирателя.</a:t>
+            </a:r>
+            <a:endParaRPr lang="ru-RU" sz="2000" dirty="0"/>
+          </a:p>
+          <a:p>
+            <a:endParaRPr lang="ru-RU" dirty="0"/>
+          </a:p>
+        </p:txBody>
+      </p:sp>
+      <p:sp>
+        <p:nvSpPr>
+          <p:cNvPr id="4" name="Объект 3"/>
+          <p:cNvSpPr>
+            <a:spLocks noGrp="1"/>
+          </p:cNvSpPr>
+          <p:nvPr>
+            <p:ph sz="half" idx="2"/>
+          </p:nvPr>
+        </p:nvSpPr>
+        <p:spPr>
+          <a:xfrm>
+            <a:off x="3519577" y="948906"/>
+            <a:ext cx="8583283" cy="5814203"/>
+          </a:xfrm>
+        </p:spPr>
+        <p:txBody>
+          <a:bodyPr>
+            <a:normAutofit lnSpcReduction="10000"/>
+          </a:bodyPr>
+          <a:lstStyle/>
+          <a:p>
+            <a:endParaRPr lang="ru-RU" dirty="0"/>
+          </a:p>
+        </p:txBody>
+      </p:sp>
+      <p:pic>
+        <p:nvPicPr>
+          <p:cNvPr id="1026" name="Picture 2"/>
+          <p:cNvPicPr>
+            <a:picLocks noChangeAspect="1" noChangeArrowheads="1"/>
+          </p:cNvPicPr>
+          <p:nvPr/>
+        </p:nvPicPr>
+        <p:blipFill>
+          <a:blip r:embed="rId2">
+            <a:extLst>
+              <a:ext uri="{28A0092B-C50C-407E-A947-70E740481C1C}">
+                <a14:useLocalDpi xmlns:a14="http://schemas.microsoft.com/office/drawing/2010/main" val="0"/>
+              </a:ext>
+            </a:extLst>
+          </a:blip>
+          <a:srcRect/>
+          <a:stretch>
+            <a:fillRect/>
+          </a:stretch>
+        </p:blipFill>
+        <p:spPr bwMode="auto">
+          <a:xfrm>
+            <a:off x="3631719" y="1024907"/>
+            <a:ext cx="8441385" cy="4099184"/>
+          </a:xfrm>
+          <a:prstGeom prst="rect">
+            <a:avLst/>
+          </a:prstGeom>
+          <a:noFill/>
+          <a:ln>
+            <a:noFill/>
+          </a:ln>
+          <a:effectLst/>
+          <a:extLst>
+            <a:ext uri="{909E8E84-426E-40DD-AFC4-6F175D3DCCD1}">
+              <a14:hiddenFill xmlns:a14="http://schemas.microsoft.com/office/drawing/2010/main">
+                <a:solidFill>
+                  <a:schemeClr val="accent1"/>
+                </a:solidFill>
+              </a14:hiddenFill>
+            </a:ext>
+            <a:ext uri="{91240B29-F687-4F45-9708-019B960494DF}">
+              <a14:hiddenLine xmlns:a14="http://schemas.microsoft.com/office/drawing/2010/main" w="9525">
+                <a:solidFill>
+                  <a:schemeClr val="tx1"/>
+                </a:solidFill>
+                <a:miter lim="800000"/>
+                <a:headEnd/>
+                <a:tailEnd/>
+              </a14:hiddenLine>
+            </a:ext>
+            <a:ext uri="{AF507438-7753-43E0-B8FC-AC1667EBCBE1}">
+              <a14:hiddenEffects xmlns:a14="http://schemas.microsoft.com/office/drawing/2010/main">
+                <a:effectLst>
+                  <a:outerShdw dist="35921" dir="2700000" algn="ctr" rotWithShape="0">
+                    <a:schemeClr val="bg2"/>
+                  </a:outerShdw>
+                </a:effectLst>
+              </a14:hiddenEffects>
+            </a:ext>
+          </a:extLst>
+        </p:spPr>
+      </p:pic>
+    </p:spTree>
+    <p:extLst>
+      <p:ext uri="{BB962C8B-B14F-4D97-AF65-F5344CB8AC3E}">
         <p14:creationId xmlns:p14="http://schemas.microsoft.com/office/powerpoint/2010/main" val="922491933"/>
       </p:ext>
     </p:extLst>
@@ -5314,8 +5644,33 @@
             </a:r>
             <a:r>
               <a:rPr lang="ru-RU" dirty="0" smtClean="0"/>
-              <a:t>код кодируется ФИО и дата рождения избирателя.</a:t>
-            </a:r>
+              <a:t>код кодируется </a:t>
+            </a:r>
+            <a:r>
+              <a:rPr lang="ru-RU" dirty="0" smtClean="0"/>
+              <a:t>данные из поля </a:t>
+            </a:r>
+            <a:r>
+              <a:rPr lang="en-US" dirty="0" smtClean="0"/>
+              <a:t>“</a:t>
+            </a:r>
+            <a:r>
+              <a:rPr lang="en-US" dirty="0"/>
+              <a:t>QR </a:t>
+            </a:r>
+            <a:r>
+              <a:rPr lang="ru-RU" dirty="0"/>
+              <a:t>текст</a:t>
+            </a:r>
+            <a:r>
+              <a:rPr lang="en-US" dirty="0" smtClean="0"/>
+              <a:t>”</a:t>
+            </a:r>
+            <a:r>
+              <a:rPr lang="ru-RU" dirty="0" smtClean="0"/>
+              <a:t>.</a:t>
+            </a:r>
+            <a:endParaRPr lang="ru-RU" dirty="0" smtClean="0"/>
           </a:p>
           <a:p>
             <a:r>
@@ -5785,7 +6140,7 @@
   <a:extraClrSchemeLst/>
   <a:extLst>
     <a:ext uri="{05A4C25C-085E-4340-85A3-A5531E510DB2}">
-      <thm15:themeFamily xmlns:thm15="http://schemas.microsoft.com/office/thememl/2012/main" xmlns="" name="Office Theme" id="{62F939B6-93AF-4DB8-9C6B-D6C7DFDC589F}" vid="{4A3C46E8-61CC-4603-A589-7422A47A8E4A}"/>
+      <thm15:themeFamily xmlns="" xmlns:thm15="http://schemas.microsoft.com/office/thememl/2012/main" name="Office Theme" id="{62F939B6-93AF-4DB8-9C6B-D6C7DFDC589F}" vid="{4A3C46E8-61CC-4603-A589-7422A47A8E4A}"/>
     </a:ext>
   </a:extLst>
 </a:theme>

</xml_diff>